<commit_message>
add cp3*.tex, pythagorean-triangles.pptxm minor edit coaching.pptx
</commit_message>
<xml_diff>
--- a/spring15/slidesS15/coaching.pptx
+++ b/spring15/slidesS15/coaching.pptx
@@ -5,50 +5,52 @@
     <p:sldMasterId id="2147483650" r:id="rId1"/>
   </p:sldMasterIdLst>
   <p:notesMasterIdLst>
-    <p:notesMasterId r:id="rId35"/>
+    <p:notesMasterId r:id="rId37"/>
   </p:notesMasterIdLst>
   <p:handoutMasterIdLst>
-    <p:handoutMasterId r:id="rId36"/>
+    <p:handoutMasterId r:id="rId38"/>
   </p:handoutMasterIdLst>
   <p:sldIdLst>
     <p:sldId id="392" r:id="rId2"/>
     <p:sldId id="393" r:id="rId3"/>
     <p:sldId id="394" r:id="rId4"/>
     <p:sldId id="404" r:id="rId5"/>
-    <p:sldId id="421" r:id="rId6"/>
-    <p:sldId id="422" r:id="rId7"/>
-    <p:sldId id="423" r:id="rId8"/>
-    <p:sldId id="424" r:id="rId9"/>
-    <p:sldId id="405" r:id="rId10"/>
-    <p:sldId id="406" r:id="rId11"/>
-    <p:sldId id="407" r:id="rId12"/>
-    <p:sldId id="411" r:id="rId13"/>
-    <p:sldId id="412" r:id="rId14"/>
-    <p:sldId id="413" r:id="rId15"/>
-    <p:sldId id="395" r:id="rId16"/>
-    <p:sldId id="399" r:id="rId17"/>
-    <p:sldId id="396" r:id="rId18"/>
-    <p:sldId id="397" r:id="rId19"/>
-    <p:sldId id="398" r:id="rId20"/>
-    <p:sldId id="425" r:id="rId21"/>
-    <p:sldId id="400" r:id="rId22"/>
-    <p:sldId id="401" r:id="rId23"/>
-    <p:sldId id="402" r:id="rId24"/>
-    <p:sldId id="403" r:id="rId25"/>
-    <p:sldId id="414" r:id="rId26"/>
-    <p:sldId id="415" r:id="rId27"/>
-    <p:sldId id="416" r:id="rId28"/>
-    <p:sldId id="417" r:id="rId29"/>
-    <p:sldId id="418" r:id="rId30"/>
-    <p:sldId id="420" r:id="rId31"/>
-    <p:sldId id="426" r:id="rId32"/>
-    <p:sldId id="427" r:id="rId33"/>
-    <p:sldId id="428" r:id="rId34"/>
+    <p:sldId id="429" r:id="rId6"/>
+    <p:sldId id="430" r:id="rId7"/>
+    <p:sldId id="421" r:id="rId8"/>
+    <p:sldId id="422" r:id="rId9"/>
+    <p:sldId id="423" r:id="rId10"/>
+    <p:sldId id="424" r:id="rId11"/>
+    <p:sldId id="405" r:id="rId12"/>
+    <p:sldId id="406" r:id="rId13"/>
+    <p:sldId id="407" r:id="rId14"/>
+    <p:sldId id="411" r:id="rId15"/>
+    <p:sldId id="412" r:id="rId16"/>
+    <p:sldId id="413" r:id="rId17"/>
+    <p:sldId id="395" r:id="rId18"/>
+    <p:sldId id="399" r:id="rId19"/>
+    <p:sldId id="396" r:id="rId20"/>
+    <p:sldId id="397" r:id="rId21"/>
+    <p:sldId id="398" r:id="rId22"/>
+    <p:sldId id="425" r:id="rId23"/>
+    <p:sldId id="400" r:id="rId24"/>
+    <p:sldId id="401" r:id="rId25"/>
+    <p:sldId id="402" r:id="rId26"/>
+    <p:sldId id="403" r:id="rId27"/>
+    <p:sldId id="414" r:id="rId28"/>
+    <p:sldId id="415" r:id="rId29"/>
+    <p:sldId id="416" r:id="rId30"/>
+    <p:sldId id="417" r:id="rId31"/>
+    <p:sldId id="418" r:id="rId32"/>
+    <p:sldId id="420" r:id="rId33"/>
+    <p:sldId id="426" r:id="rId34"/>
+    <p:sldId id="427" r:id="rId35"/>
+    <p:sldId id="428" r:id="rId36"/>
   </p:sldIdLst>
   <p:sldSz cx="9144000" cy="6858000" type="screen4x3"/>
   <p:notesSz cx="9601200" cy="7315200"/>
   <p:custDataLst>
-    <p:tags r:id="rId38"/>
+    <p:tags r:id="rId40"/>
   </p:custDataLst>
   <p:defaultTextStyle>
     <a:defPPr>
@@ -1009,7 +1011,7 @@
               <a:pPr>
                 <a:defRPr/>
               </a:pPr>
-              <a:t>18</a:t>
+              <a:t>20</a:t>
             </a:fld>
             <a:endParaRPr lang="en-US"/>
           </a:p>
@@ -3101,10 +3103,10 @@
           <a:lstStyle/>
           <a:p>
             <a:r>
-              <a:rPr lang="en-US" sz="4000" dirty="0" smtClean="0"/>
-              <a:t>Confirming a Team Solution</a:t>
-            </a:r>
-            <a:endParaRPr lang="en-US" sz="4000" dirty="0"/>
+              <a:rPr lang="en-US" dirty="0" smtClean="0"/>
+              <a:t>Group Dynamics</a:t>
+            </a:r>
+            <a:endParaRPr lang="en-US" dirty="0"/>
           </a:p>
         </p:txBody>
       </p:sp>
@@ -3120,8 +3122,8 @@
         </p:nvSpPr>
         <p:spPr>
           <a:xfrm>
-            <a:off x="442913" y="1282700"/>
-            <a:ext cx="8447087" cy="5384800"/>
+            <a:off x="304800" y="1549400"/>
+            <a:ext cx="8623300" cy="3606800"/>
           </a:xfrm>
         </p:spPr>
         <p:txBody>
@@ -3130,31 +3132,14 @@
           <a:p>
             <a:r>
               <a:rPr lang="en-US" sz="4800" dirty="0" smtClean="0"/>
-              <a:t>When the team is satisfied with their </a:t>
-            </a:r>
-            <a:r>
-              <a:rPr lang="en-US" sz="4800" dirty="0" err="1" smtClean="0"/>
-              <a:t>soln</a:t>
-            </a:r>
+              <a:t>Report your observations in staff meeting and get advice on managing.</a:t>
+            </a:r>
+          </a:p>
+          <a:p>
             <a:r>
               <a:rPr lang="en-US" sz="4800" dirty="0" smtClean="0"/>
-              <a:t> (usually not before then), tell them if something is unclear or wrong.</a:t>
-            </a:r>
-          </a:p>
-          <a:p>
-            <a:r>
-              <a:rPr lang="en-US" sz="4800" dirty="0" smtClean="0">
-                <a:solidFill>
-                  <a:srgbClr val="0000E5"/>
-                </a:solidFill>
-              </a:rPr>
-              <a:t>Don’t fix it yourself; let the team do it.</a:t>
-            </a:r>
-            <a:endParaRPr lang="en-US" sz="4800" dirty="0">
-              <a:solidFill>
-                <a:srgbClr val="0000E5"/>
-              </a:solidFill>
-            </a:endParaRPr>
+              <a:t>Notify instructors if urgent.</a:t>
+            </a:r>
           </a:p>
         </p:txBody>
       </p:sp>
@@ -3213,6 +3198,447 @@
                 <a:defRPr/>
               </a:pPr>
               <a:t>10</a:t>
+            </a:fld>
+            <a:endParaRPr lang="en-US" dirty="0"/>
+          </a:p>
+        </p:txBody>
+      </p:sp>
+    </p:spTree>
+    <p:extLst>
+      <p:ext uri="{BB962C8B-B14F-4D97-AF65-F5344CB8AC3E}">
+        <p14:creationId xmlns:p14="http://schemas.microsoft.com/office/powerpoint/2010/main" val="3579123358"/>
+      </p:ext>
+    </p:extLst>
+  </p:cSld>
+  <p:clrMapOvr>
+    <a:masterClrMapping/>
+  </p:clrMapOvr>
+  <mc:AlternateContent xmlns:mc="http://schemas.openxmlformats.org/markup-compatibility/2006" xmlns:p14="http://schemas.microsoft.com/office/powerpoint/2010/main">
+    <mc:Choice Requires="p14">
+      <p:transition spd="slow" p14:dur="900" advClick="0">
+        <p:fade/>
+      </p:transition>
+    </mc:Choice>
+    <mc:Fallback xmlns="">
+      <p:transition xmlns:p14="http://schemas.microsoft.com/office/powerpoint/2010/main" spd="slow" advClick="0">
+        <p:fade/>
+      </p:transition>
+    </mc:Fallback>
+  </mc:AlternateContent>
+  <p:timing>
+    <p:tnLst>
+      <p:par>
+        <p:cTn xmlns:p14="http://schemas.microsoft.com/office/powerpoint/2010/main" id="1" dur="indefinite" restart="never" nodeType="tmRoot">
+          <p:childTnLst>
+            <p:seq concurrent="1" nextAc="seek">
+              <p:cTn id="2" dur="indefinite" nodeType="mainSeq">
+                <p:childTnLst>
+                  <p:par>
+                    <p:cTn id="3" fill="hold">
+                      <p:stCondLst>
+                        <p:cond delay="indefinite"/>
+                      </p:stCondLst>
+                      <p:childTnLst>
+                        <p:par>
+                          <p:cTn id="4" fill="hold">
+                            <p:stCondLst>
+                              <p:cond delay="0"/>
+                            </p:stCondLst>
+                            <p:childTnLst>
+                              <p:par>
+                                <p:cTn id="5" presetID="9" presetClass="entr" presetSubtype="0" fill="hold" nodeType="clickEffect">
+                                  <p:stCondLst>
+                                    <p:cond delay="0"/>
+                                  </p:stCondLst>
+                                  <p:childTnLst>
+                                    <p:set>
+                                      <p:cBhvr>
+                                        <p:cTn id="6" dur="1" fill="hold">
+                                          <p:stCondLst>
+                                            <p:cond delay="0"/>
+                                          </p:stCondLst>
+                                        </p:cTn>
+                                        <p:tgtEl>
+                                          <p:spTgt spid="3">
+                                            <p:txEl>
+                                              <p:pRg st="1" end="1"/>
+                                            </p:txEl>
+                                          </p:spTgt>
+                                        </p:tgtEl>
+                                        <p:attrNameLst>
+                                          <p:attrName>style.visibility</p:attrName>
+                                        </p:attrNameLst>
+                                      </p:cBhvr>
+                                      <p:to>
+                                        <p:strVal val="visible"/>
+                                      </p:to>
+                                    </p:set>
+                                    <p:animEffect transition="in" filter="dissolve">
+                                      <p:cBhvr>
+                                        <p:cTn id="7" dur="500"/>
+                                        <p:tgtEl>
+                                          <p:spTgt spid="3">
+                                            <p:txEl>
+                                              <p:pRg st="1" end="1"/>
+                                            </p:txEl>
+                                          </p:spTgt>
+                                        </p:tgtEl>
+                                      </p:cBhvr>
+                                    </p:animEffect>
+                                  </p:childTnLst>
+                                </p:cTn>
+                              </p:par>
+                            </p:childTnLst>
+                          </p:cTn>
+                        </p:par>
+                      </p:childTnLst>
+                    </p:cTn>
+                  </p:par>
+                </p:childTnLst>
+              </p:cTn>
+              <p:prevCondLst>
+                <p:cond evt="onPrev" delay="0">
+                  <p:tgtEl>
+                    <p:sldTgt/>
+                  </p:tgtEl>
+                </p:cond>
+              </p:prevCondLst>
+              <p:nextCondLst>
+                <p:cond evt="onNext" delay="0">
+                  <p:tgtEl>
+                    <p:sldTgt/>
+                  </p:tgtEl>
+                </p:cond>
+              </p:nextCondLst>
+            </p:seq>
+          </p:childTnLst>
+        </p:cTn>
+      </p:par>
+    </p:tnLst>
+  </p:timing>
+</p:sld>
+</file>
+
+<file path=ppt/slides/slide11.xml><?xml version="1.0" encoding="utf-8"?>
+<p:sld xmlns:a="http://schemas.openxmlformats.org/drawingml/2006/main" xmlns:r="http://schemas.openxmlformats.org/officeDocument/2006/relationships" xmlns:p="http://schemas.openxmlformats.org/presentationml/2006/main">
+  <p:cSld>
+    <p:spTree>
+      <p:nvGrpSpPr>
+        <p:cNvPr id="1" name=""/>
+        <p:cNvGrpSpPr/>
+        <p:nvPr/>
+      </p:nvGrpSpPr>
+      <p:grpSpPr>
+        <a:xfrm>
+          <a:off x="0" y="0"/>
+          <a:ext cx="0" cy="0"/>
+          <a:chOff x="0" y="0"/>
+          <a:chExt cx="0" cy="0"/>
+        </a:xfrm>
+      </p:grpSpPr>
+      <p:sp>
+        <p:nvSpPr>
+          <p:cNvPr id="2" name="Title 1"/>
+          <p:cNvSpPr>
+            <a:spLocks noGrp="1"/>
+          </p:cNvSpPr>
+          <p:nvPr>
+            <p:ph type="title"/>
+          </p:nvPr>
+        </p:nvSpPr>
+        <p:spPr/>
+        <p:txBody>
+          <a:bodyPr/>
+          <a:lstStyle/>
+          <a:p>
+            <a:r>
+              <a:rPr lang="en-US" dirty="0" smtClean="0"/>
+              <a:t>Team Solutions</a:t>
+            </a:r>
+            <a:endParaRPr lang="en-US" dirty="0"/>
+          </a:p>
+        </p:txBody>
+      </p:sp>
+      <p:sp>
+        <p:nvSpPr>
+          <p:cNvPr id="3" name="Content Placeholder 2"/>
+          <p:cNvSpPr>
+            <a:spLocks noGrp="1"/>
+          </p:cNvSpPr>
+          <p:nvPr>
+            <p:ph idx="1"/>
+          </p:nvPr>
+        </p:nvSpPr>
+        <p:spPr>
+          <a:xfrm>
+            <a:off x="241300" y="1409700"/>
+            <a:ext cx="8585200" cy="4038600"/>
+          </a:xfrm>
+        </p:spPr>
+        <p:txBody>
+          <a:bodyPr/>
+          <a:lstStyle/>
+          <a:p>
+            <a:r>
+              <a:rPr lang="en-US" sz="4800" dirty="0" smtClean="0"/>
+              <a:t>A </a:t>
+            </a:r>
+            <a:r>
+              <a:rPr lang="en-US" sz="4800" dirty="0" smtClean="0">
+                <a:solidFill>
+                  <a:srgbClr val="008000"/>
+                </a:solidFill>
+              </a:rPr>
+              <a:t>good answer</a:t>
+            </a:r>
+            <a:r>
+              <a:rPr lang="en-US" sz="4800" dirty="0" smtClean="0"/>
+              <a:t> is one that a student from another team who wanted the solution could </a:t>
+            </a:r>
+            <a:r>
+              <a:rPr lang="en-US" sz="4800" dirty="0" smtClean="0">
+                <a:solidFill>
+                  <a:srgbClr val="0000E5"/>
+                </a:solidFill>
+              </a:rPr>
+              <a:t>look at the board and say “of course.”</a:t>
+            </a:r>
+            <a:endParaRPr lang="en-US" sz="4800" dirty="0">
+              <a:solidFill>
+                <a:srgbClr val="0000E5"/>
+              </a:solidFill>
+            </a:endParaRPr>
+          </a:p>
+        </p:txBody>
+      </p:sp>
+      <p:sp>
+        <p:nvSpPr>
+          <p:cNvPr id="5" name="Rectangle 11"/>
+          <p:cNvSpPr>
+            <a:spLocks noGrp="1" noChangeArrowheads="1"/>
+          </p:cNvSpPr>
+          <p:nvPr>
+            <p:ph type="sldNum" sz="quarter" idx="4"/>
+          </p:nvPr>
+        </p:nvSpPr>
+        <p:spPr bwMode="auto">
+          <a:xfrm>
+            <a:off x="8061932" y="6553200"/>
+            <a:ext cx="1082072" cy="276999"/>
+          </a:xfrm>
+          <a:prstGeom prst="rect">
+            <a:avLst/>
+          </a:prstGeom>
+          <a:noFill/>
+          <a:ln w="9525">
+            <a:noFill/>
+            <a:miter lim="800000"/>
+            <a:headEnd/>
+            <a:tailEnd/>
+          </a:ln>
+          <a:effectLst/>
+        </p:spPr>
+        <p:txBody>
+          <a:bodyPr vert="horz" wrap="none" lIns="91440" tIns="45720" rIns="91440" bIns="45720" numCol="1" anchor="t" anchorCtr="0" compatLnSpc="1">
+            <a:prstTxWarp prst="textNoShape">
+              <a:avLst/>
+            </a:prstTxWarp>
+            <a:spAutoFit/>
+          </a:bodyPr>
+          <a:lstStyle>
+            <a:lvl1pPr algn="r">
+              <a:defRPr sz="1200">
+                <a:latin typeface="Comic Sans MS" pitchFamily="66" charset="0"/>
+              </a:defRPr>
+            </a:lvl1pPr>
+          </a:lstStyle>
+          <a:p>
+            <a:pPr>
+              <a:defRPr/>
+            </a:pPr>
+            <a:r>
+              <a:rPr lang="en-US" dirty="0" smtClean="0"/>
+              <a:t>coaching.</a:t>
+            </a:r>
+            <a:fld id="{EBFB97A3-F52F-4FD6-B1AC-522A20C95467}" type="slidenum">
+              <a:rPr lang="en-US" smtClean="0"/>
+              <a:pPr>
+                <a:defRPr/>
+              </a:pPr>
+              <a:t>11</a:t>
+            </a:fld>
+            <a:endParaRPr lang="en-US" dirty="0"/>
+          </a:p>
+        </p:txBody>
+      </p:sp>
+    </p:spTree>
+    <p:extLst>
+      <p:ext uri="{BB962C8B-B14F-4D97-AF65-F5344CB8AC3E}">
+        <p14:creationId xmlns:p14="http://schemas.microsoft.com/office/powerpoint/2010/main" val="2445494053"/>
+      </p:ext>
+    </p:extLst>
+  </p:cSld>
+  <p:clrMapOvr>
+    <a:masterClrMapping/>
+  </p:clrMapOvr>
+  <p:transition xmlns:p14="http://schemas.microsoft.com/office/powerpoint/2010/main" spd="slow" advClick="0">
+    <p:fade thruBlk="1"/>
+  </p:transition>
+  <p:timing>
+    <p:tnLst>
+      <p:par>
+        <p:cTn xmlns:p14="http://schemas.microsoft.com/office/powerpoint/2010/main" id="1" dur="indefinite" restart="never" nodeType="tmRoot"/>
+      </p:par>
+    </p:tnLst>
+  </p:timing>
+</p:sld>
+</file>
+
+<file path=ppt/slides/slide12.xml><?xml version="1.0" encoding="utf-8"?>
+<p:sld xmlns:a="http://schemas.openxmlformats.org/drawingml/2006/main" xmlns:r="http://schemas.openxmlformats.org/officeDocument/2006/relationships" xmlns:p="http://schemas.openxmlformats.org/presentationml/2006/main">
+  <p:cSld>
+    <p:spTree>
+      <p:nvGrpSpPr>
+        <p:cNvPr id="1" name=""/>
+        <p:cNvGrpSpPr/>
+        <p:nvPr/>
+      </p:nvGrpSpPr>
+      <p:grpSpPr>
+        <a:xfrm>
+          <a:off x="0" y="0"/>
+          <a:ext cx="0" cy="0"/>
+          <a:chOff x="0" y="0"/>
+          <a:chExt cx="0" cy="0"/>
+        </a:xfrm>
+      </p:grpSpPr>
+      <p:sp>
+        <p:nvSpPr>
+          <p:cNvPr id="2" name="Title 1"/>
+          <p:cNvSpPr>
+            <a:spLocks noGrp="1"/>
+          </p:cNvSpPr>
+          <p:nvPr>
+            <p:ph type="title"/>
+          </p:nvPr>
+        </p:nvSpPr>
+        <p:spPr/>
+        <p:txBody>
+          <a:bodyPr/>
+          <a:lstStyle/>
+          <a:p>
+            <a:r>
+              <a:rPr lang="en-US" sz="4000" dirty="0" smtClean="0"/>
+              <a:t>Confirming a Team Solution</a:t>
+            </a:r>
+            <a:endParaRPr lang="en-US" sz="4000" dirty="0"/>
+          </a:p>
+        </p:txBody>
+      </p:sp>
+      <p:sp>
+        <p:nvSpPr>
+          <p:cNvPr id="3" name="Content Placeholder 2"/>
+          <p:cNvSpPr>
+            <a:spLocks noGrp="1"/>
+          </p:cNvSpPr>
+          <p:nvPr>
+            <p:ph idx="1"/>
+          </p:nvPr>
+        </p:nvSpPr>
+        <p:spPr>
+          <a:xfrm>
+            <a:off x="442913" y="1282700"/>
+            <a:ext cx="8447087" cy="5384800"/>
+          </a:xfrm>
+        </p:spPr>
+        <p:txBody>
+          <a:bodyPr/>
+          <a:lstStyle/>
+          <a:p>
+            <a:r>
+              <a:rPr lang="en-US" sz="4800" dirty="0" smtClean="0"/>
+              <a:t>When the team is satisfied with their </a:t>
+            </a:r>
+            <a:r>
+              <a:rPr lang="en-US" sz="4800" dirty="0" err="1" smtClean="0"/>
+              <a:t>soln</a:t>
+            </a:r>
+            <a:r>
+              <a:rPr lang="en-US" sz="4800" dirty="0" smtClean="0"/>
+              <a:t> (usually not before then), tell them if something is unclear or wrong.</a:t>
+            </a:r>
+          </a:p>
+          <a:p>
+            <a:r>
+              <a:rPr lang="en-US" sz="4800" dirty="0" smtClean="0">
+                <a:solidFill>
+                  <a:srgbClr val="0000E5"/>
+                </a:solidFill>
+              </a:rPr>
+              <a:t>Don’t fix it yourself; let the team do it.</a:t>
+            </a:r>
+            <a:endParaRPr lang="en-US" sz="4800" dirty="0">
+              <a:solidFill>
+                <a:srgbClr val="0000E5"/>
+              </a:solidFill>
+            </a:endParaRPr>
+          </a:p>
+        </p:txBody>
+      </p:sp>
+      <p:sp>
+        <p:nvSpPr>
+          <p:cNvPr id="5" name="Rectangle 11"/>
+          <p:cNvSpPr>
+            <a:spLocks noGrp="1" noChangeArrowheads="1"/>
+          </p:cNvSpPr>
+          <p:nvPr>
+            <p:ph type="sldNum" sz="quarter" idx="4"/>
+          </p:nvPr>
+        </p:nvSpPr>
+        <p:spPr bwMode="auto">
+          <a:xfrm>
+            <a:off x="8061932" y="6553200"/>
+            <a:ext cx="1082072" cy="276999"/>
+          </a:xfrm>
+          <a:prstGeom prst="rect">
+            <a:avLst/>
+          </a:prstGeom>
+          <a:noFill/>
+          <a:ln w="9525">
+            <a:noFill/>
+            <a:miter lim="800000"/>
+            <a:headEnd/>
+            <a:tailEnd/>
+          </a:ln>
+          <a:effectLst/>
+        </p:spPr>
+        <p:txBody>
+          <a:bodyPr vert="horz" wrap="none" lIns="91440" tIns="45720" rIns="91440" bIns="45720" numCol="1" anchor="t" anchorCtr="0" compatLnSpc="1">
+            <a:prstTxWarp prst="textNoShape">
+              <a:avLst/>
+            </a:prstTxWarp>
+            <a:spAutoFit/>
+          </a:bodyPr>
+          <a:lstStyle>
+            <a:lvl1pPr algn="r">
+              <a:defRPr sz="1200">
+                <a:latin typeface="Comic Sans MS" pitchFamily="66" charset="0"/>
+              </a:defRPr>
+            </a:lvl1pPr>
+          </a:lstStyle>
+          <a:p>
+            <a:pPr>
+              <a:defRPr/>
+            </a:pPr>
+            <a:r>
+              <a:rPr lang="en-US" dirty="0" smtClean="0"/>
+              <a:t>coaching.</a:t>
+            </a:r>
+            <a:fld id="{EBFB97A3-F52F-4FD6-B1AC-522A20C95467}" type="slidenum">
+              <a:rPr lang="en-US" smtClean="0"/>
+              <a:pPr>
+                <a:defRPr/>
+              </a:pPr>
+              <a:t>12</a:t>
             </a:fld>
             <a:endParaRPr lang="en-US" dirty="0"/>
           </a:p>
@@ -3334,7 +3760,7 @@
 </p:sld>
 </file>
 
-<file path=ppt/slides/slide11.xml><?xml version="1.0" encoding="utf-8"?>
+<file path=ppt/slides/slide13.xml><?xml version="1.0" encoding="utf-8"?>
 <p:sld xmlns:a="http://schemas.openxmlformats.org/drawingml/2006/main" xmlns:r="http://schemas.openxmlformats.org/officeDocument/2006/relationships" xmlns:p="http://schemas.openxmlformats.org/presentationml/2006/main">
   <p:cSld>
     <p:spTree>
@@ -3493,7 +3919,7 @@
               <a:pPr>
                 <a:defRPr/>
               </a:pPr>
-              <a:t>11</a:t>
+              <a:t>13</a:t>
             </a:fld>
             <a:endParaRPr lang="en-US" dirty="0"/>
           </a:p>
@@ -3618,7 +4044,7 @@
 </p:sld>
 </file>
 
-<file path=ppt/slides/slide12.xml><?xml version="1.0" encoding="utf-8"?>
+<file path=ppt/slides/slide14.xml><?xml version="1.0" encoding="utf-8"?>
 <p:sld xmlns:a="http://schemas.openxmlformats.org/drawingml/2006/main" xmlns:r="http://schemas.openxmlformats.org/officeDocument/2006/relationships" xmlns:p="http://schemas.openxmlformats.org/presentationml/2006/main">
   <p:cSld>
     <p:spTree>
@@ -3774,7 +4200,7 @@
               <a:pPr>
                 <a:defRPr/>
               </a:pPr>
-              <a:t>12</a:t>
+              <a:t>14</a:t>
             </a:fld>
             <a:endParaRPr lang="en-US" dirty="0"/>
           </a:p>
@@ -3784,450 +4210,6 @@
     <p:extLst>
       <p:ext uri="{BB962C8B-B14F-4D97-AF65-F5344CB8AC3E}">
         <p14:creationId xmlns:p14="http://schemas.microsoft.com/office/powerpoint/2010/main" val="1916238805"/>
-      </p:ext>
-    </p:extLst>
-  </p:cSld>
-  <p:clrMapOvr>
-    <a:masterClrMapping/>
-  </p:clrMapOvr>
-  <mc:AlternateContent xmlns:mc="http://schemas.openxmlformats.org/markup-compatibility/2006" xmlns:p14="http://schemas.microsoft.com/office/powerpoint/2010/main">
-    <mc:Choice Requires="p14">
-      <p:transition spd="slow" p14:dur="900" advClick="0">
-        <p:fade/>
-      </p:transition>
-    </mc:Choice>
-    <mc:Fallback xmlns="">
-      <p:transition xmlns:p14="http://schemas.microsoft.com/office/powerpoint/2010/main" spd="slow" advClick="0">
-        <p:fade/>
-      </p:transition>
-    </mc:Fallback>
-  </mc:AlternateContent>
-  <p:timing>
-    <p:tnLst>
-      <p:par>
-        <p:cTn xmlns:p14="http://schemas.microsoft.com/office/powerpoint/2010/main" id="1" dur="indefinite" restart="never" nodeType="tmRoot"/>
-      </p:par>
-    </p:tnLst>
-  </p:timing>
-</p:sld>
-</file>
-
-<file path=ppt/slides/slide13.xml><?xml version="1.0" encoding="utf-8"?>
-<p:sld xmlns:a="http://schemas.openxmlformats.org/drawingml/2006/main" xmlns:r="http://schemas.openxmlformats.org/officeDocument/2006/relationships" xmlns:p="http://schemas.openxmlformats.org/presentationml/2006/main">
-  <p:cSld>
-    <p:spTree>
-      <p:nvGrpSpPr>
-        <p:cNvPr id="1" name=""/>
-        <p:cNvGrpSpPr/>
-        <p:nvPr/>
-      </p:nvGrpSpPr>
-      <p:grpSpPr>
-        <a:xfrm>
-          <a:off x="0" y="0"/>
-          <a:ext cx="0" cy="0"/>
-          <a:chOff x="0" y="0"/>
-          <a:chExt cx="0" cy="0"/>
-        </a:xfrm>
-      </p:grpSpPr>
-      <p:sp>
-        <p:nvSpPr>
-          <p:cNvPr id="2" name="Title 1"/>
-          <p:cNvSpPr>
-            <a:spLocks noGrp="1"/>
-          </p:cNvSpPr>
-          <p:nvPr>
-            <p:ph type="title"/>
-          </p:nvPr>
-        </p:nvSpPr>
-        <p:spPr/>
-        <p:txBody>
-          <a:bodyPr/>
-          <a:lstStyle/>
-          <a:p>
-            <a:r>
-              <a:rPr lang="en-US" sz="4000" dirty="0" smtClean="0"/>
-              <a:t>Confirming a Team Solution</a:t>
-            </a:r>
-            <a:endParaRPr lang="en-US" sz="4000" dirty="0"/>
-          </a:p>
-        </p:txBody>
-      </p:sp>
-      <p:sp>
-        <p:nvSpPr>
-          <p:cNvPr id="3" name="Content Placeholder 2"/>
-          <p:cNvSpPr>
-            <a:spLocks noGrp="1"/>
-          </p:cNvSpPr>
-          <p:nvPr>
-            <p:ph idx="1"/>
-          </p:nvPr>
-        </p:nvSpPr>
-        <p:spPr>
-          <a:xfrm>
-            <a:off x="241300" y="1409700"/>
-            <a:ext cx="8902700" cy="4813300"/>
-          </a:xfrm>
-        </p:spPr>
-        <p:txBody>
-          <a:bodyPr/>
-          <a:lstStyle/>
-          <a:p>
-            <a:r>
-              <a:rPr lang="en-US" sz="4800" dirty="0" smtClean="0"/>
-              <a:t>If the solution seems OK, then </a:t>
-            </a:r>
-            <a:r>
-              <a:rPr lang="en-US" sz="4800" dirty="0" smtClean="0">
-                <a:solidFill>
-                  <a:schemeClr val="accent1">
-                    <a:lumMod val="50000"/>
-                  </a:schemeClr>
-                </a:solidFill>
-              </a:rPr>
-              <a:t>ask if everyone is ready</a:t>
-            </a:r>
-            <a:r>
-              <a:rPr lang="en-US" sz="4800" dirty="0" smtClean="0"/>
-              <a:t> to be called upon to explain every part.  If you </a:t>
-            </a:r>
-            <a:r>
-              <a:rPr lang="en-US" sz="4800" dirty="0"/>
-              <a:t>believe </a:t>
-            </a:r>
-            <a:r>
-              <a:rPr lang="en-US" sz="4800" dirty="0" smtClean="0"/>
-              <a:t>they </a:t>
-            </a:r>
-            <a:r>
-              <a:rPr lang="en-US" sz="4800" dirty="0" smtClean="0">
-                <a:solidFill>
-                  <a:srgbClr val="0000FF"/>
-                </a:solidFill>
-              </a:rPr>
-              <a:t>all understand, then </a:t>
-            </a:r>
-            <a:r>
-              <a:rPr lang="en-US" sz="4800" dirty="0" smtClean="0"/>
-              <a:t>you can </a:t>
-            </a:r>
-            <a:r>
-              <a:rPr lang="en-US" sz="4800" dirty="0" smtClean="0">
-                <a:solidFill>
-                  <a:srgbClr val="0000FF"/>
-                </a:solidFill>
-              </a:rPr>
-              <a:t>move </a:t>
-            </a:r>
-            <a:r>
-              <a:rPr lang="en-US" sz="4800" dirty="0">
-                <a:solidFill>
-                  <a:srgbClr val="0000FF"/>
-                </a:solidFill>
-              </a:rPr>
-              <a:t>on</a:t>
-            </a:r>
-            <a:r>
-              <a:rPr lang="en-US" sz="4800" dirty="0"/>
-              <a:t>.</a:t>
-            </a:r>
-            <a:endParaRPr lang="en-US" sz="4800" dirty="0">
-              <a:solidFill>
-                <a:srgbClr val="0000E5"/>
-              </a:solidFill>
-            </a:endParaRPr>
-          </a:p>
-        </p:txBody>
-      </p:sp>
-      <p:sp>
-        <p:nvSpPr>
-          <p:cNvPr id="5" name="Rectangle 11"/>
-          <p:cNvSpPr>
-            <a:spLocks noGrp="1" noChangeArrowheads="1"/>
-          </p:cNvSpPr>
-          <p:nvPr>
-            <p:ph type="sldNum" sz="quarter" idx="4"/>
-          </p:nvPr>
-        </p:nvSpPr>
-        <p:spPr bwMode="auto">
-          <a:xfrm>
-            <a:off x="8061932" y="6553200"/>
-            <a:ext cx="1082072" cy="276999"/>
-          </a:xfrm>
-          <a:prstGeom prst="rect">
-            <a:avLst/>
-          </a:prstGeom>
-          <a:noFill/>
-          <a:ln w="9525">
-            <a:noFill/>
-            <a:miter lim="800000"/>
-            <a:headEnd/>
-            <a:tailEnd/>
-          </a:ln>
-          <a:effectLst/>
-        </p:spPr>
-        <p:txBody>
-          <a:bodyPr vert="horz" wrap="none" lIns="91440" tIns="45720" rIns="91440" bIns="45720" numCol="1" anchor="t" anchorCtr="0" compatLnSpc="1">
-            <a:prstTxWarp prst="textNoShape">
-              <a:avLst/>
-            </a:prstTxWarp>
-            <a:spAutoFit/>
-          </a:bodyPr>
-          <a:lstStyle>
-            <a:lvl1pPr algn="r">
-              <a:defRPr sz="1200">
-                <a:latin typeface="Comic Sans MS" pitchFamily="66" charset="0"/>
-              </a:defRPr>
-            </a:lvl1pPr>
-          </a:lstStyle>
-          <a:p>
-            <a:pPr>
-              <a:defRPr/>
-            </a:pPr>
-            <a:r>
-              <a:rPr lang="en-US" dirty="0" smtClean="0"/>
-              <a:t>coaching.</a:t>
-            </a:r>
-            <a:fld id="{EBFB97A3-F52F-4FD6-B1AC-522A20C95467}" type="slidenum">
-              <a:rPr lang="en-US" smtClean="0"/>
-              <a:pPr>
-                <a:defRPr/>
-              </a:pPr>
-              <a:t>13</a:t>
-            </a:fld>
-            <a:endParaRPr lang="en-US" dirty="0"/>
-          </a:p>
-        </p:txBody>
-      </p:sp>
-    </p:spTree>
-    <p:extLst>
-      <p:ext uri="{BB962C8B-B14F-4D97-AF65-F5344CB8AC3E}">
-        <p14:creationId xmlns:p14="http://schemas.microsoft.com/office/powerpoint/2010/main" val="3221555200"/>
-      </p:ext>
-    </p:extLst>
-  </p:cSld>
-  <p:clrMapOvr>
-    <a:masterClrMapping/>
-  </p:clrMapOvr>
-  <mc:AlternateContent xmlns:mc="http://schemas.openxmlformats.org/markup-compatibility/2006" xmlns:p14="http://schemas.microsoft.com/office/powerpoint/2010/main">
-    <mc:Choice Requires="p14">
-      <p:transition spd="slow" p14:dur="900" advClick="0">
-        <p:fade/>
-      </p:transition>
-    </mc:Choice>
-    <mc:Fallback xmlns="">
-      <p:transition xmlns:p14="http://schemas.microsoft.com/office/powerpoint/2010/main" spd="slow" advClick="0">
-        <p:fade/>
-      </p:transition>
-    </mc:Fallback>
-  </mc:AlternateContent>
-  <p:timing>
-    <p:tnLst>
-      <p:par>
-        <p:cTn xmlns:p14="http://schemas.microsoft.com/office/powerpoint/2010/main" id="1" dur="indefinite" restart="never" nodeType="tmRoot"/>
-      </p:par>
-    </p:tnLst>
-  </p:timing>
-</p:sld>
-</file>
-
-<file path=ppt/slides/slide14.xml><?xml version="1.0" encoding="utf-8"?>
-<p:sld xmlns:a="http://schemas.openxmlformats.org/drawingml/2006/main" xmlns:r="http://schemas.openxmlformats.org/officeDocument/2006/relationships" xmlns:p="http://schemas.openxmlformats.org/presentationml/2006/main">
-  <p:cSld>
-    <p:spTree>
-      <p:nvGrpSpPr>
-        <p:cNvPr id="1" name=""/>
-        <p:cNvGrpSpPr/>
-        <p:nvPr/>
-      </p:nvGrpSpPr>
-      <p:grpSpPr>
-        <a:xfrm>
-          <a:off x="0" y="0"/>
-          <a:ext cx="0" cy="0"/>
-          <a:chOff x="0" y="0"/>
-          <a:chExt cx="0" cy="0"/>
-        </a:xfrm>
-      </p:grpSpPr>
-      <p:sp>
-        <p:nvSpPr>
-          <p:cNvPr id="2" name="Title 1"/>
-          <p:cNvSpPr>
-            <a:spLocks noGrp="1"/>
-          </p:cNvSpPr>
-          <p:nvPr>
-            <p:ph type="title"/>
-          </p:nvPr>
-        </p:nvSpPr>
-        <p:spPr/>
-        <p:txBody>
-          <a:bodyPr/>
-          <a:lstStyle/>
-          <a:p>
-            <a:r>
-              <a:rPr lang="en-US" sz="4000" dirty="0" smtClean="0"/>
-              <a:t>Confirming a Team Solution</a:t>
-            </a:r>
-            <a:endParaRPr lang="en-US" sz="4000" dirty="0"/>
-          </a:p>
-        </p:txBody>
-      </p:sp>
-      <p:sp>
-        <p:nvSpPr>
-          <p:cNvPr id="3" name="Content Placeholder 2"/>
-          <p:cNvSpPr>
-            <a:spLocks noGrp="1"/>
-          </p:cNvSpPr>
-          <p:nvPr>
-            <p:ph idx="1"/>
-          </p:nvPr>
-        </p:nvSpPr>
-        <p:spPr>
-          <a:xfrm>
-            <a:off x="241300" y="1409700"/>
-            <a:ext cx="8839200" cy="5435600"/>
-          </a:xfrm>
-        </p:spPr>
-        <p:txBody>
-          <a:bodyPr/>
-          <a:lstStyle/>
-          <a:p>
-            <a:r>
-              <a:rPr lang="en-US" sz="4800" dirty="0" smtClean="0"/>
-              <a:t>If the solution seems OK, then </a:t>
-            </a:r>
-            <a:r>
-              <a:rPr lang="en-US" sz="4800" dirty="0" smtClean="0">
-                <a:solidFill>
-                  <a:schemeClr val="accent1">
-                    <a:lumMod val="50000"/>
-                  </a:schemeClr>
-                </a:solidFill>
-              </a:rPr>
-              <a:t>ask if everyone is ready</a:t>
-            </a:r>
-            <a:r>
-              <a:rPr lang="en-US" sz="4800" dirty="0" smtClean="0"/>
-              <a:t> to be called upon to explain every part.  Or </a:t>
-            </a:r>
-            <a:r>
-              <a:rPr lang="en-US" sz="4800" dirty="0">
-                <a:solidFill>
-                  <a:srgbClr val="0000FF"/>
-                </a:solidFill>
-              </a:rPr>
-              <a:t>pick </a:t>
-            </a:r>
-            <a:r>
-              <a:rPr lang="en-US" sz="4800" dirty="0" smtClean="0">
-                <a:solidFill>
-                  <a:srgbClr val="0000FF"/>
-                </a:solidFill>
-              </a:rPr>
-              <a:t>a tricky part for someone </a:t>
-            </a:r>
-            <a:r>
-              <a:rPr lang="en-US" sz="4800" dirty="0">
-                <a:solidFill>
-                  <a:srgbClr val="0000FF"/>
-                </a:solidFill>
-              </a:rPr>
-              <a:t>to </a:t>
-            </a:r>
-            <a:r>
-              <a:rPr lang="en-US" sz="4800" dirty="0" smtClean="0">
-                <a:solidFill>
-                  <a:srgbClr val="0000FF"/>
-                </a:solidFill>
-              </a:rPr>
-              <a:t>explain</a:t>
-            </a:r>
-            <a:r>
-              <a:rPr lang="en-US" sz="4800" dirty="0" smtClean="0"/>
-              <a:t>—</a:t>
-            </a:r>
-            <a:r>
-              <a:rPr lang="en-US" sz="4800" dirty="0">
-                <a:solidFill>
-                  <a:srgbClr val="BB0FAB"/>
-                </a:solidFill>
-              </a:rPr>
-              <a:t>not a volunteer</a:t>
-            </a:r>
-            <a:r>
-              <a:rPr lang="en-US" sz="4800" dirty="0"/>
-              <a:t>.</a:t>
-            </a:r>
-            <a:endParaRPr lang="en-US" sz="4800" dirty="0">
-              <a:solidFill>
-                <a:srgbClr val="0000E5"/>
-              </a:solidFill>
-            </a:endParaRPr>
-          </a:p>
-        </p:txBody>
-      </p:sp>
-      <p:sp>
-        <p:nvSpPr>
-          <p:cNvPr id="5" name="Rectangle 11"/>
-          <p:cNvSpPr>
-            <a:spLocks noGrp="1" noChangeArrowheads="1"/>
-          </p:cNvSpPr>
-          <p:nvPr>
-            <p:ph type="sldNum" sz="quarter" idx="4"/>
-          </p:nvPr>
-        </p:nvSpPr>
-        <p:spPr bwMode="auto">
-          <a:xfrm>
-            <a:off x="8061932" y="6553200"/>
-            <a:ext cx="1082072" cy="276999"/>
-          </a:xfrm>
-          <a:prstGeom prst="rect">
-            <a:avLst/>
-          </a:prstGeom>
-          <a:noFill/>
-          <a:ln w="9525">
-            <a:noFill/>
-            <a:miter lim="800000"/>
-            <a:headEnd/>
-            <a:tailEnd/>
-          </a:ln>
-          <a:effectLst/>
-        </p:spPr>
-        <p:txBody>
-          <a:bodyPr vert="horz" wrap="none" lIns="91440" tIns="45720" rIns="91440" bIns="45720" numCol="1" anchor="t" anchorCtr="0" compatLnSpc="1">
-            <a:prstTxWarp prst="textNoShape">
-              <a:avLst/>
-            </a:prstTxWarp>
-            <a:spAutoFit/>
-          </a:bodyPr>
-          <a:lstStyle>
-            <a:lvl1pPr algn="r">
-              <a:defRPr sz="1200">
-                <a:latin typeface="Comic Sans MS" pitchFamily="66" charset="0"/>
-              </a:defRPr>
-            </a:lvl1pPr>
-          </a:lstStyle>
-          <a:p>
-            <a:pPr>
-              <a:defRPr/>
-            </a:pPr>
-            <a:r>
-              <a:rPr lang="en-US" dirty="0" smtClean="0"/>
-              <a:t>coaching.</a:t>
-            </a:r>
-            <a:fld id="{EBFB97A3-F52F-4FD6-B1AC-522A20C95467}" type="slidenum">
-              <a:rPr lang="en-US" smtClean="0"/>
-              <a:pPr>
-                <a:defRPr/>
-              </a:pPr>
-              <a:t>14</a:t>
-            </a:fld>
-            <a:endParaRPr lang="en-US" dirty="0"/>
-          </a:p>
-        </p:txBody>
-      </p:sp>
-    </p:spTree>
-    <p:extLst>
-      <p:ext uri="{BB962C8B-B14F-4D97-AF65-F5344CB8AC3E}">
-        <p14:creationId xmlns:p14="http://schemas.microsoft.com/office/powerpoint/2010/main" val="3399419976"/>
       </p:ext>
     </p:extLst>
   </p:cSld>
@@ -4283,10 +4265,33 @@
             <p:ph type="title"/>
           </p:nvPr>
         </p:nvSpPr>
+        <p:spPr/>
+        <p:txBody>
+          <a:bodyPr/>
+          <a:lstStyle/>
+          <a:p>
+            <a:r>
+              <a:rPr lang="en-US" sz="4000" dirty="0" smtClean="0"/>
+              <a:t>Confirming a Team Solution</a:t>
+            </a:r>
+            <a:endParaRPr lang="en-US" sz="4000" dirty="0"/>
+          </a:p>
+        </p:txBody>
+      </p:sp>
+      <p:sp>
+        <p:nvSpPr>
+          <p:cNvPr id="3" name="Content Placeholder 2"/>
+          <p:cNvSpPr>
+            <a:spLocks noGrp="1"/>
+          </p:cNvSpPr>
+          <p:nvPr>
+            <p:ph idx="1"/>
+          </p:nvPr>
+        </p:nvSpPr>
         <p:spPr>
           <a:xfrm>
-            <a:off x="1447800" y="304800"/>
-            <a:ext cx="7543800" cy="1143000"/>
+            <a:off x="241300" y="1409700"/>
+            <a:ext cx="8902700" cy="4813300"/>
           </a:xfrm>
         </p:spPr>
         <p:txBody>
@@ -4294,123 +4299,118 @@
           <a:lstStyle/>
           <a:p>
             <a:r>
-              <a:rPr lang="en-US" dirty="0" smtClean="0"/>
-              <a:t>Coaching not Tutoring</a:t>
-            </a:r>
-            <a:endParaRPr lang="en-US" dirty="0"/>
-          </a:p>
-        </p:txBody>
-      </p:sp>
-      <p:sp>
-        <p:nvSpPr>
-          <p:cNvPr id="3" name="Content Placeholder 2"/>
-          <p:cNvSpPr>
-            <a:spLocks noGrp="1"/>
-          </p:cNvSpPr>
-          <p:nvPr>
-            <p:ph idx="1"/>
-          </p:nvPr>
-        </p:nvSpPr>
-        <p:spPr>
-          <a:xfrm>
-            <a:off x="342900" y="1574800"/>
-            <a:ext cx="8470899" cy="4902200"/>
-          </a:xfrm>
-        </p:spPr>
-        <p:txBody>
-          <a:bodyPr/>
-          <a:lstStyle/>
-          <a:p>
-            <a:pPr marL="571500" indent="-571500">
-              <a:buFont typeface="Arial"/>
-              <a:buChar char="•"/>
-            </a:pPr>
-            <a:r>
-              <a:rPr lang="en-US" dirty="0" smtClean="0">
+              <a:rPr lang="en-US" sz="4800" dirty="0" smtClean="0"/>
+              <a:t>If the solution seems OK, then </a:t>
+            </a:r>
+            <a:r>
+              <a:rPr lang="en-US" sz="4800" dirty="0" smtClean="0">
                 <a:solidFill>
-                  <a:srgbClr val="008000"/>
+                  <a:schemeClr val="accent1">
+                    <a:lumMod val="50000"/>
+                  </a:schemeClr>
                 </a:solidFill>
               </a:rPr>
-              <a:t>Answer a question with a question</a:t>
-            </a:r>
-            <a:r>
-              <a:rPr lang="en-US" dirty="0" smtClean="0"/>
-              <a:t>:</a:t>
-            </a:r>
-          </a:p>
-          <a:p>
-            <a:r>
-              <a:rPr lang="en-US" dirty="0" smtClean="0"/>
-              <a:t>    “</a:t>
-            </a:r>
-            <a:r>
-              <a:rPr lang="en-US" dirty="0" smtClean="0">
+              <a:t>ask if everyone is ready</a:t>
+            </a:r>
+            <a:r>
+              <a:rPr lang="en-US" sz="4800" dirty="0" smtClean="0"/>
+              <a:t> to be called upon to explain every part.  If you </a:t>
+            </a:r>
+            <a:r>
+              <a:rPr lang="en-US" sz="4800" dirty="0"/>
+              <a:t>believe </a:t>
+            </a:r>
+            <a:r>
+              <a:rPr lang="en-US" sz="4800" dirty="0" smtClean="0"/>
+              <a:t>they </a:t>
+            </a:r>
+            <a:r>
+              <a:rPr lang="en-US" sz="4800" dirty="0" smtClean="0">
                 <a:solidFill>
                   <a:srgbClr val="0000FF"/>
                 </a:solidFill>
               </a:rPr>
-              <a:t>Did you ask your teammates?</a:t>
-            </a:r>
-            <a:r>
-              <a:rPr lang="en-US" dirty="0" smtClean="0"/>
-              <a:t>”</a:t>
-            </a:r>
-          </a:p>
-          <a:p>
-            <a:r>
-              <a:rPr lang="en-US" dirty="0" smtClean="0">
-                <a:solidFill>
-                  <a:srgbClr val="BB0FAB"/>
-                </a:solidFill>
-              </a:rPr>
-              <a:t>Watch out</a:t>
-            </a:r>
-            <a:r>
-              <a:rPr lang="en-US" dirty="0" smtClean="0"/>
-              <a:t>: students say “yes” when they mean they asked someone, not everyone.</a:t>
-            </a:r>
-          </a:p>
-          <a:p>
-            <a:r>
-              <a:rPr lang="en-US" dirty="0" smtClean="0"/>
-              <a:t>You can help by </a:t>
-            </a:r>
-            <a:r>
-              <a:rPr lang="en-US" dirty="0" smtClean="0">
+              <a:t>all understand, then </a:t>
+            </a:r>
+            <a:r>
+              <a:rPr lang="en-US" sz="4800" dirty="0" smtClean="0"/>
+              <a:t>you can </a:t>
+            </a:r>
+            <a:r>
+              <a:rPr lang="en-US" sz="4800" dirty="0" smtClean="0">
                 <a:solidFill>
                   <a:srgbClr val="0000FF"/>
                 </a:solidFill>
               </a:rPr>
-              <a:t>calling the team’s attention to the student</a:t>
-            </a:r>
-            <a:r>
-              <a:rPr lang="en-US" dirty="0" smtClean="0"/>
-              <a:t> and have him ask his question.</a:t>
-            </a:r>
-            <a:endParaRPr lang="en-US" dirty="0"/>
-          </a:p>
-        </p:txBody>
-      </p:sp>
-      <p:sp>
-        <p:nvSpPr>
-          <p:cNvPr id="4" name="Slide Number Placeholder 3"/>
-          <p:cNvSpPr>
-            <a:spLocks noGrp="1"/>
+              <a:t>move </a:t>
+            </a:r>
+            <a:r>
+              <a:rPr lang="en-US" sz="4800" dirty="0">
+                <a:solidFill>
+                  <a:srgbClr val="0000FF"/>
+                </a:solidFill>
+              </a:rPr>
+              <a:t>on</a:t>
+            </a:r>
+            <a:r>
+              <a:rPr lang="en-US" sz="4800" dirty="0"/>
+              <a:t>.</a:t>
+            </a:r>
+            <a:endParaRPr lang="en-US" sz="4800" dirty="0">
+              <a:solidFill>
+                <a:srgbClr val="0000E5"/>
+              </a:solidFill>
+            </a:endParaRPr>
+          </a:p>
+        </p:txBody>
+      </p:sp>
+      <p:sp>
+        <p:nvSpPr>
+          <p:cNvPr id="5" name="Rectangle 11"/>
+          <p:cNvSpPr>
+            <a:spLocks noGrp="1" noChangeArrowheads="1"/>
           </p:cNvSpPr>
           <p:nvPr>
             <p:ph type="sldNum" sz="quarter" idx="4"/>
           </p:nvPr>
         </p:nvSpPr>
-        <p:spPr/>
-        <p:txBody>
-          <a:bodyPr/>
-          <a:lstStyle/>
+        <p:spPr bwMode="auto">
+          <a:xfrm>
+            <a:off x="8061932" y="6553200"/>
+            <a:ext cx="1082072" cy="276999"/>
+          </a:xfrm>
+          <a:prstGeom prst="rect">
+            <a:avLst/>
+          </a:prstGeom>
+          <a:noFill/>
+          <a:ln w="9525">
+            <a:noFill/>
+            <a:miter lim="800000"/>
+            <a:headEnd/>
+            <a:tailEnd/>
+          </a:ln>
+          <a:effectLst/>
+        </p:spPr>
+        <p:txBody>
+          <a:bodyPr vert="horz" wrap="none" lIns="91440" tIns="45720" rIns="91440" bIns="45720" numCol="1" anchor="t" anchorCtr="0" compatLnSpc="1">
+            <a:prstTxWarp prst="textNoShape">
+              <a:avLst/>
+            </a:prstTxWarp>
+            <a:spAutoFit/>
+          </a:bodyPr>
+          <a:lstStyle>
+            <a:lvl1pPr algn="r">
+              <a:defRPr sz="1200">
+                <a:latin typeface="Comic Sans MS" pitchFamily="66" charset="0"/>
+              </a:defRPr>
+            </a:lvl1pPr>
+          </a:lstStyle>
           <a:p>
             <a:pPr>
               <a:defRPr/>
             </a:pPr>
             <a:r>
-              <a:rPr lang="en-US" smtClean="0"/>
+              <a:rPr lang="en-US" dirty="0" smtClean="0"/>
               <a:t>coaching.</a:t>
             </a:r>
             <a:fld id="{EBFB97A3-F52F-4FD6-B1AC-522A20C95467}" type="slidenum">
@@ -4427,16 +4427,25 @@
     </p:spTree>
     <p:extLst>
       <p:ext uri="{BB962C8B-B14F-4D97-AF65-F5344CB8AC3E}">
-        <p14:creationId xmlns:p14="http://schemas.microsoft.com/office/powerpoint/2010/main" val="2179100238"/>
+        <p14:creationId xmlns:p14="http://schemas.microsoft.com/office/powerpoint/2010/main" val="3221555200"/>
       </p:ext>
     </p:extLst>
   </p:cSld>
   <p:clrMapOvr>
     <a:masterClrMapping/>
   </p:clrMapOvr>
-  <p:transition xmlns:p14="http://schemas.microsoft.com/office/powerpoint/2010/main" spd="slow" advClick="0">
-    <p:fade thruBlk="1"/>
-  </p:transition>
+  <mc:AlternateContent xmlns:mc="http://schemas.openxmlformats.org/markup-compatibility/2006" xmlns:p14="http://schemas.microsoft.com/office/powerpoint/2010/main">
+    <mc:Choice Requires="p14">
+      <p:transition spd="slow" p14:dur="900" advClick="0">
+        <p:fade/>
+      </p:transition>
+    </mc:Choice>
+    <mc:Fallback xmlns="">
+      <p:transition xmlns:p14="http://schemas.microsoft.com/office/powerpoint/2010/main" spd="slow" advClick="0">
+        <p:fade/>
+      </p:transition>
+    </mc:Fallback>
+  </mc:AlternateContent>
   <p:timing>
     <p:tnLst>
       <p:par>
@@ -4480,6 +4489,423 @@
           <a:lstStyle/>
           <a:p>
             <a:r>
+              <a:rPr lang="en-US" sz="4000" dirty="0" smtClean="0"/>
+              <a:t>Confirming a Team Solution</a:t>
+            </a:r>
+            <a:endParaRPr lang="en-US" sz="4000" dirty="0"/>
+          </a:p>
+        </p:txBody>
+      </p:sp>
+      <p:sp>
+        <p:nvSpPr>
+          <p:cNvPr id="3" name="Content Placeholder 2"/>
+          <p:cNvSpPr>
+            <a:spLocks noGrp="1"/>
+          </p:cNvSpPr>
+          <p:nvPr>
+            <p:ph idx="1"/>
+          </p:nvPr>
+        </p:nvSpPr>
+        <p:spPr>
+          <a:xfrm>
+            <a:off x="241300" y="1409700"/>
+            <a:ext cx="8839200" cy="5435600"/>
+          </a:xfrm>
+        </p:spPr>
+        <p:txBody>
+          <a:bodyPr/>
+          <a:lstStyle/>
+          <a:p>
+            <a:r>
+              <a:rPr lang="en-US" sz="4800" dirty="0" smtClean="0"/>
+              <a:t>If the solution seems OK, then </a:t>
+            </a:r>
+            <a:r>
+              <a:rPr lang="en-US" sz="4800" dirty="0" smtClean="0">
+                <a:solidFill>
+                  <a:schemeClr val="accent1">
+                    <a:lumMod val="50000"/>
+                  </a:schemeClr>
+                </a:solidFill>
+              </a:rPr>
+              <a:t>ask if everyone is ready</a:t>
+            </a:r>
+            <a:r>
+              <a:rPr lang="en-US" sz="4800" dirty="0" smtClean="0"/>
+              <a:t> to be called upon to explain every part.  Or </a:t>
+            </a:r>
+            <a:r>
+              <a:rPr lang="en-US" sz="4800" dirty="0">
+                <a:solidFill>
+                  <a:srgbClr val="0000FF"/>
+                </a:solidFill>
+              </a:rPr>
+              <a:t>pick </a:t>
+            </a:r>
+            <a:r>
+              <a:rPr lang="en-US" sz="4800" dirty="0" smtClean="0">
+                <a:solidFill>
+                  <a:srgbClr val="0000FF"/>
+                </a:solidFill>
+              </a:rPr>
+              <a:t>a tricky part for someone </a:t>
+            </a:r>
+            <a:r>
+              <a:rPr lang="en-US" sz="4800" dirty="0">
+                <a:solidFill>
+                  <a:srgbClr val="0000FF"/>
+                </a:solidFill>
+              </a:rPr>
+              <a:t>to </a:t>
+            </a:r>
+            <a:r>
+              <a:rPr lang="en-US" sz="4800" dirty="0" smtClean="0">
+                <a:solidFill>
+                  <a:srgbClr val="0000FF"/>
+                </a:solidFill>
+              </a:rPr>
+              <a:t>explain</a:t>
+            </a:r>
+            <a:r>
+              <a:rPr lang="en-US" sz="4800" dirty="0" smtClean="0"/>
+              <a:t>—</a:t>
+            </a:r>
+            <a:r>
+              <a:rPr lang="en-US" sz="4800" dirty="0">
+                <a:solidFill>
+                  <a:srgbClr val="BB0FAB"/>
+                </a:solidFill>
+              </a:rPr>
+              <a:t>not a volunteer</a:t>
+            </a:r>
+            <a:r>
+              <a:rPr lang="en-US" sz="4800" dirty="0"/>
+              <a:t>.</a:t>
+            </a:r>
+            <a:endParaRPr lang="en-US" sz="4800" dirty="0">
+              <a:solidFill>
+                <a:srgbClr val="0000E5"/>
+              </a:solidFill>
+            </a:endParaRPr>
+          </a:p>
+        </p:txBody>
+      </p:sp>
+      <p:sp>
+        <p:nvSpPr>
+          <p:cNvPr id="5" name="Rectangle 11"/>
+          <p:cNvSpPr>
+            <a:spLocks noGrp="1" noChangeArrowheads="1"/>
+          </p:cNvSpPr>
+          <p:nvPr>
+            <p:ph type="sldNum" sz="quarter" idx="4"/>
+          </p:nvPr>
+        </p:nvSpPr>
+        <p:spPr bwMode="auto">
+          <a:xfrm>
+            <a:off x="8061932" y="6553200"/>
+            <a:ext cx="1082072" cy="276999"/>
+          </a:xfrm>
+          <a:prstGeom prst="rect">
+            <a:avLst/>
+          </a:prstGeom>
+          <a:noFill/>
+          <a:ln w="9525">
+            <a:noFill/>
+            <a:miter lim="800000"/>
+            <a:headEnd/>
+            <a:tailEnd/>
+          </a:ln>
+          <a:effectLst/>
+        </p:spPr>
+        <p:txBody>
+          <a:bodyPr vert="horz" wrap="none" lIns="91440" tIns="45720" rIns="91440" bIns="45720" numCol="1" anchor="t" anchorCtr="0" compatLnSpc="1">
+            <a:prstTxWarp prst="textNoShape">
+              <a:avLst/>
+            </a:prstTxWarp>
+            <a:spAutoFit/>
+          </a:bodyPr>
+          <a:lstStyle>
+            <a:lvl1pPr algn="r">
+              <a:defRPr sz="1200">
+                <a:latin typeface="Comic Sans MS" pitchFamily="66" charset="0"/>
+              </a:defRPr>
+            </a:lvl1pPr>
+          </a:lstStyle>
+          <a:p>
+            <a:pPr>
+              <a:defRPr/>
+            </a:pPr>
+            <a:r>
+              <a:rPr lang="en-US" dirty="0" smtClean="0"/>
+              <a:t>coaching.</a:t>
+            </a:r>
+            <a:fld id="{EBFB97A3-F52F-4FD6-B1AC-522A20C95467}" type="slidenum">
+              <a:rPr lang="en-US" smtClean="0"/>
+              <a:pPr>
+                <a:defRPr/>
+              </a:pPr>
+              <a:t>16</a:t>
+            </a:fld>
+            <a:endParaRPr lang="en-US" dirty="0"/>
+          </a:p>
+        </p:txBody>
+      </p:sp>
+    </p:spTree>
+    <p:extLst>
+      <p:ext uri="{BB962C8B-B14F-4D97-AF65-F5344CB8AC3E}">
+        <p14:creationId xmlns:p14="http://schemas.microsoft.com/office/powerpoint/2010/main" val="3399419976"/>
+      </p:ext>
+    </p:extLst>
+  </p:cSld>
+  <p:clrMapOvr>
+    <a:masterClrMapping/>
+  </p:clrMapOvr>
+  <mc:AlternateContent xmlns:mc="http://schemas.openxmlformats.org/markup-compatibility/2006" xmlns:p14="http://schemas.microsoft.com/office/powerpoint/2010/main">
+    <mc:Choice Requires="p14">
+      <p:transition spd="slow" p14:dur="900" advClick="0">
+        <p:fade/>
+      </p:transition>
+    </mc:Choice>
+    <mc:Fallback xmlns="">
+      <p:transition xmlns:p14="http://schemas.microsoft.com/office/powerpoint/2010/main" spd="slow" advClick="0">
+        <p:fade/>
+      </p:transition>
+    </mc:Fallback>
+  </mc:AlternateContent>
+  <p:timing>
+    <p:tnLst>
+      <p:par>
+        <p:cTn xmlns:p14="http://schemas.microsoft.com/office/powerpoint/2010/main" id="1" dur="indefinite" restart="never" nodeType="tmRoot"/>
+      </p:par>
+    </p:tnLst>
+  </p:timing>
+</p:sld>
+</file>
+
+<file path=ppt/slides/slide17.xml><?xml version="1.0" encoding="utf-8"?>
+<p:sld xmlns:a="http://schemas.openxmlformats.org/drawingml/2006/main" xmlns:r="http://schemas.openxmlformats.org/officeDocument/2006/relationships" xmlns:p="http://schemas.openxmlformats.org/presentationml/2006/main">
+  <p:cSld>
+    <p:spTree>
+      <p:nvGrpSpPr>
+        <p:cNvPr id="1" name=""/>
+        <p:cNvGrpSpPr/>
+        <p:nvPr/>
+      </p:nvGrpSpPr>
+      <p:grpSpPr>
+        <a:xfrm>
+          <a:off x="0" y="0"/>
+          <a:ext cx="0" cy="0"/>
+          <a:chOff x="0" y="0"/>
+          <a:chExt cx="0" cy="0"/>
+        </a:xfrm>
+      </p:grpSpPr>
+      <p:sp>
+        <p:nvSpPr>
+          <p:cNvPr id="2" name="Title 1"/>
+          <p:cNvSpPr>
+            <a:spLocks noGrp="1"/>
+          </p:cNvSpPr>
+          <p:nvPr>
+            <p:ph type="title"/>
+          </p:nvPr>
+        </p:nvSpPr>
+        <p:spPr>
+          <a:xfrm>
+            <a:off x="1447800" y="304800"/>
+            <a:ext cx="7543800" cy="1143000"/>
+          </a:xfrm>
+        </p:spPr>
+        <p:txBody>
+          <a:bodyPr/>
+          <a:lstStyle/>
+          <a:p>
+            <a:r>
+              <a:rPr lang="en-US" dirty="0" smtClean="0"/>
+              <a:t>Coaching not Tutoring</a:t>
+            </a:r>
+            <a:endParaRPr lang="en-US" dirty="0"/>
+          </a:p>
+        </p:txBody>
+      </p:sp>
+      <p:sp>
+        <p:nvSpPr>
+          <p:cNvPr id="3" name="Content Placeholder 2"/>
+          <p:cNvSpPr>
+            <a:spLocks noGrp="1"/>
+          </p:cNvSpPr>
+          <p:nvPr>
+            <p:ph idx="1"/>
+          </p:nvPr>
+        </p:nvSpPr>
+        <p:spPr>
+          <a:xfrm>
+            <a:off x="342900" y="1574800"/>
+            <a:ext cx="8470899" cy="4902200"/>
+          </a:xfrm>
+        </p:spPr>
+        <p:txBody>
+          <a:bodyPr/>
+          <a:lstStyle/>
+          <a:p>
+            <a:pPr marL="571500" indent="-571500">
+              <a:buFont typeface="Arial"/>
+              <a:buChar char="•"/>
+            </a:pPr>
+            <a:r>
+              <a:rPr lang="en-US" dirty="0" smtClean="0">
+                <a:solidFill>
+                  <a:srgbClr val="008000"/>
+                </a:solidFill>
+              </a:rPr>
+              <a:t>Answer a question with a question</a:t>
+            </a:r>
+            <a:r>
+              <a:rPr lang="en-US" dirty="0" smtClean="0"/>
+              <a:t>:</a:t>
+            </a:r>
+          </a:p>
+          <a:p>
+            <a:r>
+              <a:rPr lang="en-US" dirty="0" smtClean="0"/>
+              <a:t>    “</a:t>
+            </a:r>
+            <a:r>
+              <a:rPr lang="en-US" dirty="0" smtClean="0">
+                <a:solidFill>
+                  <a:srgbClr val="0000FF"/>
+                </a:solidFill>
+              </a:rPr>
+              <a:t>Did you ask your teammates?</a:t>
+            </a:r>
+            <a:r>
+              <a:rPr lang="en-US" dirty="0" smtClean="0"/>
+              <a:t>”</a:t>
+            </a:r>
+          </a:p>
+          <a:p>
+            <a:r>
+              <a:rPr lang="en-US" dirty="0" smtClean="0">
+                <a:solidFill>
+                  <a:srgbClr val="BB0FAB"/>
+                </a:solidFill>
+              </a:rPr>
+              <a:t>Watch out</a:t>
+            </a:r>
+            <a:r>
+              <a:rPr lang="en-US" dirty="0" smtClean="0"/>
+              <a:t>: students say “yes” when they mean they asked someone, not everyone.</a:t>
+            </a:r>
+          </a:p>
+          <a:p>
+            <a:r>
+              <a:rPr lang="en-US" dirty="0" smtClean="0"/>
+              <a:t>You can help by </a:t>
+            </a:r>
+            <a:r>
+              <a:rPr lang="en-US" dirty="0" smtClean="0">
+                <a:solidFill>
+                  <a:srgbClr val="0000FF"/>
+                </a:solidFill>
+              </a:rPr>
+              <a:t>calling the team’s attention to the student</a:t>
+            </a:r>
+            <a:r>
+              <a:rPr lang="en-US" dirty="0" smtClean="0"/>
+              <a:t> and have him ask his question.</a:t>
+            </a:r>
+            <a:endParaRPr lang="en-US" dirty="0"/>
+          </a:p>
+        </p:txBody>
+      </p:sp>
+      <p:sp>
+        <p:nvSpPr>
+          <p:cNvPr id="4" name="Slide Number Placeholder 3"/>
+          <p:cNvSpPr>
+            <a:spLocks noGrp="1"/>
+          </p:cNvSpPr>
+          <p:nvPr>
+            <p:ph type="sldNum" sz="quarter" idx="4"/>
+          </p:nvPr>
+        </p:nvSpPr>
+        <p:spPr/>
+        <p:txBody>
+          <a:bodyPr/>
+          <a:lstStyle/>
+          <a:p>
+            <a:pPr>
+              <a:defRPr/>
+            </a:pPr>
+            <a:r>
+              <a:rPr lang="en-US" smtClean="0"/>
+              <a:t>coaching.</a:t>
+            </a:r>
+            <a:fld id="{EBFB97A3-F52F-4FD6-B1AC-522A20C95467}" type="slidenum">
+              <a:rPr lang="en-US" smtClean="0"/>
+              <a:pPr>
+                <a:defRPr/>
+              </a:pPr>
+              <a:t>17</a:t>
+            </a:fld>
+            <a:endParaRPr lang="en-US" dirty="0"/>
+          </a:p>
+        </p:txBody>
+      </p:sp>
+    </p:spTree>
+    <p:extLst>
+      <p:ext uri="{BB962C8B-B14F-4D97-AF65-F5344CB8AC3E}">
+        <p14:creationId xmlns:p14="http://schemas.microsoft.com/office/powerpoint/2010/main" val="2179100238"/>
+      </p:ext>
+    </p:extLst>
+  </p:cSld>
+  <p:clrMapOvr>
+    <a:masterClrMapping/>
+  </p:clrMapOvr>
+  <p:transition xmlns:p14="http://schemas.microsoft.com/office/powerpoint/2010/main" spd="slow" advClick="0">
+    <p:fade thruBlk="1"/>
+  </p:transition>
+  <p:timing>
+    <p:tnLst>
+      <p:par>
+        <p:cTn xmlns:p14="http://schemas.microsoft.com/office/powerpoint/2010/main" id="1" dur="indefinite" restart="never" nodeType="tmRoot"/>
+      </p:par>
+    </p:tnLst>
+  </p:timing>
+</p:sld>
+</file>
+
+<file path=ppt/slides/slide18.xml><?xml version="1.0" encoding="utf-8"?>
+<p:sld xmlns:a="http://schemas.openxmlformats.org/drawingml/2006/main" xmlns:r="http://schemas.openxmlformats.org/officeDocument/2006/relationships" xmlns:p="http://schemas.openxmlformats.org/presentationml/2006/main">
+  <p:cSld>
+    <p:spTree>
+      <p:nvGrpSpPr>
+        <p:cNvPr id="1" name=""/>
+        <p:cNvGrpSpPr/>
+        <p:nvPr/>
+      </p:nvGrpSpPr>
+      <p:grpSpPr>
+        <a:xfrm>
+          <a:off x="0" y="0"/>
+          <a:ext cx="0" cy="0"/>
+          <a:chOff x="0" y="0"/>
+          <a:chExt cx="0" cy="0"/>
+        </a:xfrm>
+      </p:grpSpPr>
+      <p:sp>
+        <p:nvSpPr>
+          <p:cNvPr id="2" name="Title 1"/>
+          <p:cNvSpPr>
+            <a:spLocks noGrp="1"/>
+          </p:cNvSpPr>
+          <p:nvPr>
+            <p:ph type="title"/>
+          </p:nvPr>
+        </p:nvSpPr>
+        <p:spPr/>
+        <p:txBody>
+          <a:bodyPr/>
+          <a:lstStyle/>
+          <a:p>
+            <a:r>
               <a:rPr lang="en-US" dirty="0" smtClean="0"/>
               <a:t>Coaching not Tutoring</a:t>
             </a:r>
@@ -4598,7 +5024,7 @@
               <a:pPr>
                 <a:defRPr/>
               </a:pPr>
-              <a:t>16</a:t>
+              <a:t>18</a:t>
             </a:fld>
             <a:endParaRPr lang="en-US" dirty="0"/>
           </a:p>
@@ -4781,7 +5207,7 @@
 </p:sld>
 </file>
 
-<file path=ppt/slides/slide17.xml><?xml version="1.0" encoding="utf-8"?>
+<file path=ppt/slides/slide19.xml><?xml version="1.0" encoding="utf-8"?>
 <p:sld xmlns:a="http://schemas.openxmlformats.org/drawingml/2006/main" xmlns:r="http://schemas.openxmlformats.org/officeDocument/2006/relationships" xmlns:p="http://schemas.openxmlformats.org/presentationml/2006/main">
   <p:cSld>
     <p:spTree>
@@ -4934,7 +5360,7 @@
               <a:pPr>
                 <a:defRPr/>
               </a:pPr>
-              <a:t>17</a:t>
+              <a:t>19</a:t>
             </a:fld>
             <a:endParaRPr lang="en-US" dirty="0"/>
           </a:p>
@@ -5117,7 +5543,7 @@
 </p:sld>
 </file>
 
-<file path=ppt/slides/slide18.xml><?xml version="1.0" encoding="utf-8"?>
+<file path=ppt/slides/slide2.xml><?xml version="1.0" encoding="utf-8"?>
 <p:sld xmlns:a="http://schemas.openxmlformats.org/drawingml/2006/main" xmlns:r="http://schemas.openxmlformats.org/officeDocument/2006/relationships" xmlns:p="http://schemas.openxmlformats.org/presentationml/2006/main">
   <p:cSld>
     <p:spTree>
@@ -5136,6 +5562,255 @@
       </p:grpSpPr>
       <p:sp>
         <p:nvSpPr>
+          <p:cNvPr id="2" name="Title 1"/>
+          <p:cNvSpPr>
+            <a:spLocks noGrp="1"/>
+          </p:cNvSpPr>
+          <p:nvPr>
+            <p:ph type="title"/>
+          </p:nvPr>
+        </p:nvSpPr>
+        <p:spPr/>
+        <p:txBody>
+          <a:bodyPr/>
+          <a:lstStyle/>
+          <a:p>
+            <a:r>
+              <a:rPr lang="en-US" dirty="0" smtClean="0"/>
+              <a:t>Team Learning</a:t>
+            </a:r>
+            <a:endParaRPr lang="en-US" dirty="0"/>
+          </a:p>
+        </p:txBody>
+      </p:sp>
+      <p:sp>
+        <p:nvSpPr>
+          <p:cNvPr id="3" name="Content Placeholder 2"/>
+          <p:cNvSpPr>
+            <a:spLocks noGrp="1"/>
+          </p:cNvSpPr>
+          <p:nvPr>
+            <p:ph idx="1"/>
+          </p:nvPr>
+        </p:nvSpPr>
+        <p:spPr>
+          <a:xfrm>
+            <a:off x="703263" y="1612900"/>
+            <a:ext cx="7772400" cy="4114800"/>
+          </a:xfrm>
+        </p:spPr>
+        <p:txBody>
+          <a:bodyPr/>
+          <a:lstStyle/>
+          <a:p>
+            <a:r>
+              <a:rPr lang="en-US" sz="4800" dirty="0" smtClean="0"/>
+              <a:t>The objective is to teach students t</a:t>
+            </a:r>
+            <a:r>
+              <a:rPr lang="en-US" sz="4800" dirty="0"/>
+              <a:t>o </a:t>
+            </a:r>
+            <a:r>
+              <a:rPr lang="en-US" sz="4800" dirty="0" smtClean="0"/>
+              <a:t>learn from each other.</a:t>
+            </a:r>
+          </a:p>
+          <a:p>
+            <a:r>
+              <a:rPr lang="en-US" sz="4800" dirty="0" smtClean="0"/>
+              <a:t>These are the best students in the world.</a:t>
+            </a:r>
+            <a:endParaRPr lang="en-US" sz="4800" dirty="0"/>
+          </a:p>
+        </p:txBody>
+      </p:sp>
+      <p:sp>
+        <p:nvSpPr>
+          <p:cNvPr id="5" name="Rectangle 11"/>
+          <p:cNvSpPr>
+            <a:spLocks noGrp="1" noChangeArrowheads="1"/>
+          </p:cNvSpPr>
+          <p:nvPr>
+            <p:ph type="sldNum" sz="quarter" idx="4"/>
+          </p:nvPr>
+        </p:nvSpPr>
+        <p:spPr bwMode="auto">
+          <a:xfrm>
+            <a:off x="8061932" y="6553200"/>
+            <a:ext cx="1082072" cy="276999"/>
+          </a:xfrm>
+          <a:prstGeom prst="rect">
+            <a:avLst/>
+          </a:prstGeom>
+          <a:noFill/>
+          <a:ln w="9525">
+            <a:noFill/>
+            <a:miter lim="800000"/>
+            <a:headEnd/>
+            <a:tailEnd/>
+          </a:ln>
+          <a:effectLst/>
+        </p:spPr>
+        <p:txBody>
+          <a:bodyPr vert="horz" wrap="none" lIns="91440" tIns="45720" rIns="91440" bIns="45720" numCol="1" anchor="t" anchorCtr="0" compatLnSpc="1">
+            <a:prstTxWarp prst="textNoShape">
+              <a:avLst/>
+            </a:prstTxWarp>
+            <a:spAutoFit/>
+          </a:bodyPr>
+          <a:lstStyle>
+            <a:lvl1pPr algn="r">
+              <a:defRPr sz="1200">
+                <a:latin typeface="Comic Sans MS" pitchFamily="66" charset="0"/>
+              </a:defRPr>
+            </a:lvl1pPr>
+          </a:lstStyle>
+          <a:p>
+            <a:pPr>
+              <a:defRPr/>
+            </a:pPr>
+            <a:r>
+              <a:rPr lang="en-US" dirty="0" smtClean="0"/>
+              <a:t>coaching.</a:t>
+            </a:r>
+            <a:fld id="{EBFB97A3-F52F-4FD6-B1AC-522A20C95467}" type="slidenum">
+              <a:rPr lang="en-US" smtClean="0"/>
+              <a:pPr>
+                <a:defRPr/>
+              </a:pPr>
+              <a:t>2</a:t>
+            </a:fld>
+            <a:endParaRPr lang="en-US" dirty="0"/>
+          </a:p>
+        </p:txBody>
+      </p:sp>
+    </p:spTree>
+    <p:extLst>
+      <p:ext uri="{BB962C8B-B14F-4D97-AF65-F5344CB8AC3E}">
+        <p14:creationId xmlns:p14="http://schemas.microsoft.com/office/powerpoint/2010/main" val="3145946940"/>
+      </p:ext>
+    </p:extLst>
+  </p:cSld>
+  <p:clrMapOvr>
+    <a:masterClrMapping/>
+  </p:clrMapOvr>
+  <p:transition xmlns:p14="http://schemas.microsoft.com/office/powerpoint/2010/main" spd="slow" advClick="0">
+    <p:fade thruBlk="1"/>
+  </p:transition>
+  <p:timing>
+    <p:tnLst>
+      <p:par>
+        <p:cTn xmlns:p14="http://schemas.microsoft.com/office/powerpoint/2010/main" id="1" dur="indefinite" restart="never" nodeType="tmRoot">
+          <p:childTnLst>
+            <p:seq concurrent="1" nextAc="seek">
+              <p:cTn id="2" dur="indefinite" nodeType="mainSeq">
+                <p:childTnLst>
+                  <p:par>
+                    <p:cTn id="3" fill="hold">
+                      <p:stCondLst>
+                        <p:cond delay="indefinite"/>
+                      </p:stCondLst>
+                      <p:childTnLst>
+                        <p:par>
+                          <p:cTn id="4" fill="hold">
+                            <p:stCondLst>
+                              <p:cond delay="0"/>
+                            </p:stCondLst>
+                            <p:childTnLst>
+                              <p:par>
+                                <p:cTn id="5" presetID="9" presetClass="entr" presetSubtype="0" fill="hold" nodeType="clickEffect">
+                                  <p:stCondLst>
+                                    <p:cond delay="0"/>
+                                  </p:stCondLst>
+                                  <p:childTnLst>
+                                    <p:set>
+                                      <p:cBhvr>
+                                        <p:cTn id="6" dur="1" fill="hold">
+                                          <p:stCondLst>
+                                            <p:cond delay="0"/>
+                                          </p:stCondLst>
+                                        </p:cTn>
+                                        <p:tgtEl>
+                                          <p:spTgt spid="3">
+                                            <p:txEl>
+                                              <p:pRg st="1" end="1"/>
+                                            </p:txEl>
+                                          </p:spTgt>
+                                        </p:tgtEl>
+                                        <p:attrNameLst>
+                                          <p:attrName>style.visibility</p:attrName>
+                                        </p:attrNameLst>
+                                      </p:cBhvr>
+                                      <p:to>
+                                        <p:strVal val="visible"/>
+                                      </p:to>
+                                    </p:set>
+                                    <p:animEffect transition="in" filter="dissolve">
+                                      <p:cBhvr>
+                                        <p:cTn id="7" dur="500"/>
+                                        <p:tgtEl>
+                                          <p:spTgt spid="3">
+                                            <p:txEl>
+                                              <p:pRg st="1" end="1"/>
+                                            </p:txEl>
+                                          </p:spTgt>
+                                        </p:tgtEl>
+                                      </p:cBhvr>
+                                    </p:animEffect>
+                                  </p:childTnLst>
+                                </p:cTn>
+                              </p:par>
+                            </p:childTnLst>
+                          </p:cTn>
+                        </p:par>
+                      </p:childTnLst>
+                    </p:cTn>
+                  </p:par>
+                </p:childTnLst>
+              </p:cTn>
+              <p:prevCondLst>
+                <p:cond evt="onPrev" delay="0">
+                  <p:tgtEl>
+                    <p:sldTgt/>
+                  </p:tgtEl>
+                </p:cond>
+              </p:prevCondLst>
+              <p:nextCondLst>
+                <p:cond evt="onNext" delay="0">
+                  <p:tgtEl>
+                    <p:sldTgt/>
+                  </p:tgtEl>
+                </p:cond>
+              </p:nextCondLst>
+            </p:seq>
+          </p:childTnLst>
+        </p:cTn>
+      </p:par>
+    </p:tnLst>
+  </p:timing>
+</p:sld>
+</file>
+
+<file path=ppt/slides/slide20.xml><?xml version="1.0" encoding="utf-8"?>
+<p:sld xmlns:a="http://schemas.openxmlformats.org/drawingml/2006/main" xmlns:r="http://schemas.openxmlformats.org/officeDocument/2006/relationships" xmlns:p="http://schemas.openxmlformats.org/presentationml/2006/main">
+  <p:cSld>
+    <p:spTree>
+      <p:nvGrpSpPr>
+        <p:cNvPr id="1" name=""/>
+        <p:cNvGrpSpPr/>
+        <p:nvPr/>
+      </p:nvGrpSpPr>
+      <p:grpSpPr>
+        <a:xfrm>
+          <a:off x="0" y="0"/>
+          <a:ext cx="0" cy="0"/>
+          <a:chOff x="0" y="0"/>
+          <a:chExt cx="0" cy="0"/>
+        </a:xfrm>
+      </p:grpSpPr>
+      <p:sp>
+        <p:nvSpPr>
           <p:cNvPr id="3" name="Content Placeholder 2"/>
           <p:cNvSpPr>
             <a:spLocks noGrp="1"/>
@@ -5271,7 +5946,7 @@
               <a:pPr>
                 <a:defRPr/>
               </a:pPr>
-              <a:t>18</a:t>
+              <a:t>20</a:t>
             </a:fld>
             <a:endParaRPr lang="en-US" dirty="0"/>
           </a:p>
@@ -5607,7 +6282,7 @@
 </p:sld>
 </file>
 
-<file path=ppt/slides/slide19.xml><?xml version="1.0" encoding="utf-8"?>
+<file path=ppt/slides/slide21.xml><?xml version="1.0" encoding="utf-8"?>
 <p:sld xmlns:a="http://schemas.openxmlformats.org/drawingml/2006/main" xmlns:r="http://schemas.openxmlformats.org/officeDocument/2006/relationships" xmlns:p="http://schemas.openxmlformats.org/presentationml/2006/main">
   <p:cSld>
     <p:spTree>
@@ -5721,7 +6396,7 @@
               <a:pPr>
                 <a:defRPr/>
               </a:pPr>
-              <a:t>19</a:t>
+              <a:t>21</a:t>
             </a:fld>
             <a:endParaRPr lang="en-US" dirty="0"/>
           </a:p>
@@ -5940,7 +6615,7 @@
 </p:sld>
 </file>
 
-<file path=ppt/slides/slide2.xml><?xml version="1.0" encoding="utf-8"?>
+<file path=ppt/slides/slide22.xml><?xml version="1.0" encoding="utf-8"?>
 <p:sld xmlns:a="http://schemas.openxmlformats.org/drawingml/2006/main" xmlns:r="http://schemas.openxmlformats.org/officeDocument/2006/relationships" xmlns:p="http://schemas.openxmlformats.org/presentationml/2006/main">
   <p:cSld>
     <p:spTree>
@@ -5959,255 +6634,6 @@
       </p:grpSpPr>
       <p:sp>
         <p:nvSpPr>
-          <p:cNvPr id="2" name="Title 1"/>
-          <p:cNvSpPr>
-            <a:spLocks noGrp="1"/>
-          </p:cNvSpPr>
-          <p:nvPr>
-            <p:ph type="title"/>
-          </p:nvPr>
-        </p:nvSpPr>
-        <p:spPr/>
-        <p:txBody>
-          <a:bodyPr/>
-          <a:lstStyle/>
-          <a:p>
-            <a:r>
-              <a:rPr lang="en-US" dirty="0" smtClean="0"/>
-              <a:t>Team Learning</a:t>
-            </a:r>
-            <a:endParaRPr lang="en-US" dirty="0"/>
-          </a:p>
-        </p:txBody>
-      </p:sp>
-      <p:sp>
-        <p:nvSpPr>
-          <p:cNvPr id="3" name="Content Placeholder 2"/>
-          <p:cNvSpPr>
-            <a:spLocks noGrp="1"/>
-          </p:cNvSpPr>
-          <p:nvPr>
-            <p:ph idx="1"/>
-          </p:nvPr>
-        </p:nvSpPr>
-        <p:spPr>
-          <a:xfrm>
-            <a:off x="703263" y="1612900"/>
-            <a:ext cx="7772400" cy="4114800"/>
-          </a:xfrm>
-        </p:spPr>
-        <p:txBody>
-          <a:bodyPr/>
-          <a:lstStyle/>
-          <a:p>
-            <a:r>
-              <a:rPr lang="en-US" sz="4800" dirty="0" smtClean="0"/>
-              <a:t>The objective is to teach students t</a:t>
-            </a:r>
-            <a:r>
-              <a:rPr lang="en-US" sz="4800" dirty="0"/>
-              <a:t>o </a:t>
-            </a:r>
-            <a:r>
-              <a:rPr lang="en-US" sz="4800" dirty="0" smtClean="0"/>
-              <a:t>learn from each other.</a:t>
-            </a:r>
-          </a:p>
-          <a:p>
-            <a:r>
-              <a:rPr lang="en-US" sz="4800" dirty="0" smtClean="0"/>
-              <a:t>These are the best students in the world.</a:t>
-            </a:r>
-            <a:endParaRPr lang="en-US" sz="4800" dirty="0"/>
-          </a:p>
-        </p:txBody>
-      </p:sp>
-      <p:sp>
-        <p:nvSpPr>
-          <p:cNvPr id="5" name="Rectangle 11"/>
-          <p:cNvSpPr>
-            <a:spLocks noGrp="1" noChangeArrowheads="1"/>
-          </p:cNvSpPr>
-          <p:nvPr>
-            <p:ph type="sldNum" sz="quarter" idx="4"/>
-          </p:nvPr>
-        </p:nvSpPr>
-        <p:spPr bwMode="auto">
-          <a:xfrm>
-            <a:off x="8061932" y="6553200"/>
-            <a:ext cx="1082072" cy="276999"/>
-          </a:xfrm>
-          <a:prstGeom prst="rect">
-            <a:avLst/>
-          </a:prstGeom>
-          <a:noFill/>
-          <a:ln w="9525">
-            <a:noFill/>
-            <a:miter lim="800000"/>
-            <a:headEnd/>
-            <a:tailEnd/>
-          </a:ln>
-          <a:effectLst/>
-        </p:spPr>
-        <p:txBody>
-          <a:bodyPr vert="horz" wrap="none" lIns="91440" tIns="45720" rIns="91440" bIns="45720" numCol="1" anchor="t" anchorCtr="0" compatLnSpc="1">
-            <a:prstTxWarp prst="textNoShape">
-              <a:avLst/>
-            </a:prstTxWarp>
-            <a:spAutoFit/>
-          </a:bodyPr>
-          <a:lstStyle>
-            <a:lvl1pPr algn="r">
-              <a:defRPr sz="1200">
-                <a:latin typeface="Comic Sans MS" pitchFamily="66" charset="0"/>
-              </a:defRPr>
-            </a:lvl1pPr>
-          </a:lstStyle>
-          <a:p>
-            <a:pPr>
-              <a:defRPr/>
-            </a:pPr>
-            <a:r>
-              <a:rPr lang="en-US" dirty="0" smtClean="0"/>
-              <a:t>coaching.</a:t>
-            </a:r>
-            <a:fld id="{EBFB97A3-F52F-4FD6-B1AC-522A20C95467}" type="slidenum">
-              <a:rPr lang="en-US" smtClean="0"/>
-              <a:pPr>
-                <a:defRPr/>
-              </a:pPr>
-              <a:t>2</a:t>
-            </a:fld>
-            <a:endParaRPr lang="en-US" dirty="0"/>
-          </a:p>
-        </p:txBody>
-      </p:sp>
-    </p:spTree>
-    <p:extLst>
-      <p:ext uri="{BB962C8B-B14F-4D97-AF65-F5344CB8AC3E}">
-        <p14:creationId xmlns:p14="http://schemas.microsoft.com/office/powerpoint/2010/main" val="3145946940"/>
-      </p:ext>
-    </p:extLst>
-  </p:cSld>
-  <p:clrMapOvr>
-    <a:masterClrMapping/>
-  </p:clrMapOvr>
-  <p:transition xmlns:p14="http://schemas.microsoft.com/office/powerpoint/2010/main" spd="slow" advClick="0">
-    <p:fade thruBlk="1"/>
-  </p:transition>
-  <p:timing>
-    <p:tnLst>
-      <p:par>
-        <p:cTn xmlns:p14="http://schemas.microsoft.com/office/powerpoint/2010/main" id="1" dur="indefinite" restart="never" nodeType="tmRoot">
-          <p:childTnLst>
-            <p:seq concurrent="1" nextAc="seek">
-              <p:cTn id="2" dur="indefinite" nodeType="mainSeq">
-                <p:childTnLst>
-                  <p:par>
-                    <p:cTn id="3" fill="hold">
-                      <p:stCondLst>
-                        <p:cond delay="indefinite"/>
-                      </p:stCondLst>
-                      <p:childTnLst>
-                        <p:par>
-                          <p:cTn id="4" fill="hold">
-                            <p:stCondLst>
-                              <p:cond delay="0"/>
-                            </p:stCondLst>
-                            <p:childTnLst>
-                              <p:par>
-                                <p:cTn id="5" presetID="9" presetClass="entr" presetSubtype="0" fill="hold" nodeType="clickEffect">
-                                  <p:stCondLst>
-                                    <p:cond delay="0"/>
-                                  </p:stCondLst>
-                                  <p:childTnLst>
-                                    <p:set>
-                                      <p:cBhvr>
-                                        <p:cTn id="6" dur="1" fill="hold">
-                                          <p:stCondLst>
-                                            <p:cond delay="0"/>
-                                          </p:stCondLst>
-                                        </p:cTn>
-                                        <p:tgtEl>
-                                          <p:spTgt spid="3">
-                                            <p:txEl>
-                                              <p:pRg st="1" end="1"/>
-                                            </p:txEl>
-                                          </p:spTgt>
-                                        </p:tgtEl>
-                                        <p:attrNameLst>
-                                          <p:attrName>style.visibility</p:attrName>
-                                        </p:attrNameLst>
-                                      </p:cBhvr>
-                                      <p:to>
-                                        <p:strVal val="visible"/>
-                                      </p:to>
-                                    </p:set>
-                                    <p:animEffect transition="in" filter="dissolve">
-                                      <p:cBhvr>
-                                        <p:cTn id="7" dur="500"/>
-                                        <p:tgtEl>
-                                          <p:spTgt spid="3">
-                                            <p:txEl>
-                                              <p:pRg st="1" end="1"/>
-                                            </p:txEl>
-                                          </p:spTgt>
-                                        </p:tgtEl>
-                                      </p:cBhvr>
-                                    </p:animEffect>
-                                  </p:childTnLst>
-                                </p:cTn>
-                              </p:par>
-                            </p:childTnLst>
-                          </p:cTn>
-                        </p:par>
-                      </p:childTnLst>
-                    </p:cTn>
-                  </p:par>
-                </p:childTnLst>
-              </p:cTn>
-              <p:prevCondLst>
-                <p:cond evt="onPrev" delay="0">
-                  <p:tgtEl>
-                    <p:sldTgt/>
-                  </p:tgtEl>
-                </p:cond>
-              </p:prevCondLst>
-              <p:nextCondLst>
-                <p:cond evt="onNext" delay="0">
-                  <p:tgtEl>
-                    <p:sldTgt/>
-                  </p:tgtEl>
-                </p:cond>
-              </p:nextCondLst>
-            </p:seq>
-          </p:childTnLst>
-        </p:cTn>
-      </p:par>
-    </p:tnLst>
-  </p:timing>
-</p:sld>
-</file>
-
-<file path=ppt/slides/slide20.xml><?xml version="1.0" encoding="utf-8"?>
-<p:sld xmlns:a="http://schemas.openxmlformats.org/drawingml/2006/main" xmlns:r="http://schemas.openxmlformats.org/officeDocument/2006/relationships" xmlns:p="http://schemas.openxmlformats.org/presentationml/2006/main">
-  <p:cSld>
-    <p:spTree>
-      <p:nvGrpSpPr>
-        <p:cNvPr id="1" name=""/>
-        <p:cNvGrpSpPr/>
-        <p:nvPr/>
-      </p:nvGrpSpPr>
-      <p:grpSpPr>
-        <a:xfrm>
-          <a:off x="0" y="0"/>
-          <a:ext cx="0" cy="0"/>
-          <a:chOff x="0" y="0"/>
-          <a:chExt cx="0" cy="0"/>
-        </a:xfrm>
-      </p:grpSpPr>
-      <p:sp>
-        <p:nvSpPr>
           <p:cNvPr id="3" name="Content Placeholder 2"/>
           <p:cNvSpPr>
             <a:spLocks noGrp="1"/>
@@ -6288,7 +6714,7 @@
               <a:pPr>
                 <a:defRPr/>
               </a:pPr>
-              <a:t>20</a:t>
+              <a:t>22</a:t>
             </a:fld>
             <a:endParaRPr lang="en-US" dirty="0"/>
           </a:p>
@@ -6446,7 +6872,7 @@
 </p:sld>
 </file>
 
-<file path=ppt/slides/slide21.xml><?xml version="1.0" encoding="utf-8"?>
+<file path=ppt/slides/slide23.xml><?xml version="1.0" encoding="utf-8"?>
 <p:sld xmlns:a="http://schemas.openxmlformats.org/drawingml/2006/main" xmlns:r="http://schemas.openxmlformats.org/officeDocument/2006/relationships" xmlns:p="http://schemas.openxmlformats.org/presentationml/2006/main">
   <p:cSld>
     <p:spTree>
@@ -6526,7 +6952,7 @@
               <a:pPr>
                 <a:defRPr/>
               </a:pPr>
-              <a:t>21</a:t>
+              <a:t>23</a:t>
             </a:fld>
             <a:endParaRPr lang="en-US" dirty="0"/>
           </a:p>
@@ -6676,7 +7102,7 @@
 </p:sld>
 </file>
 
-<file path=ppt/slides/slide22.xml><?xml version="1.0" encoding="utf-8"?>
+<file path=ppt/slides/slide24.xml><?xml version="1.0" encoding="utf-8"?>
 <p:sld xmlns:a="http://schemas.openxmlformats.org/drawingml/2006/main" xmlns:r="http://schemas.openxmlformats.org/officeDocument/2006/relationships" xmlns:p="http://schemas.openxmlformats.org/presentationml/2006/main">
   <p:cSld>
     <p:spTree>
@@ -6793,7 +7219,7 @@
               <a:pPr>
                 <a:defRPr/>
               </a:pPr>
-              <a:t>22</a:t>
+              <a:t>24</a:t>
             </a:fld>
             <a:endParaRPr lang="en-US" dirty="0"/>
           </a:p>
@@ -6976,7 +7402,7 @@
 </p:sld>
 </file>
 
-<file path=ppt/slides/slide23.xml><?xml version="1.0" encoding="utf-8"?>
+<file path=ppt/slides/slide25.xml><?xml version="1.0" encoding="utf-8"?>
 <p:sld xmlns:a="http://schemas.openxmlformats.org/drawingml/2006/main" xmlns:r="http://schemas.openxmlformats.org/officeDocument/2006/relationships" xmlns:p="http://schemas.openxmlformats.org/presentationml/2006/main">
   <p:cSld>
     <p:spTree>
@@ -7079,7 +7505,7 @@
               <a:pPr>
                 <a:defRPr/>
               </a:pPr>
-              <a:t>23</a:t>
+              <a:t>25</a:t>
             </a:fld>
             <a:endParaRPr lang="en-US" dirty="0"/>
           </a:p>
@@ -7117,7 +7543,7 @@
 </p:sld>
 </file>
 
-<file path=ppt/slides/slide24.xml><?xml version="1.0" encoding="utf-8"?>
+<file path=ppt/slides/slide26.xml><?xml version="1.0" encoding="utf-8"?>
 <p:sld xmlns:a="http://schemas.openxmlformats.org/drawingml/2006/main" xmlns:r="http://schemas.openxmlformats.org/officeDocument/2006/relationships" xmlns:p="http://schemas.openxmlformats.org/presentationml/2006/main">
   <p:cSld>
     <p:spTree>
@@ -7219,7 +7645,7 @@
               <a:pPr>
                 <a:defRPr/>
               </a:pPr>
-              <a:t>24</a:t>
+              <a:t>26</a:t>
             </a:fld>
             <a:endParaRPr lang="en-US" dirty="0"/>
           </a:p>
@@ -7341,7 +7767,7 @@
 </p:sld>
 </file>
 
-<file path=ppt/slides/slide25.xml><?xml version="1.0" encoding="utf-8"?>
+<file path=ppt/slides/slide27.xml><?xml version="1.0" encoding="utf-8"?>
 <p:sld xmlns:a="http://schemas.openxmlformats.org/drawingml/2006/main" xmlns:r="http://schemas.openxmlformats.org/officeDocument/2006/relationships" xmlns:p="http://schemas.openxmlformats.org/presentationml/2006/main">
   <p:cSld>
     <p:spTree>
@@ -7441,7 +7867,7 @@
               <a:pPr>
                 <a:defRPr/>
               </a:pPr>
-              <a:t>25</a:t>
+              <a:t>27</a:t>
             </a:fld>
             <a:endParaRPr lang="en-US" dirty="0"/>
           </a:p>
@@ -7479,7 +7905,7 @@
 </p:sld>
 </file>
 
-<file path=ppt/slides/slide26.xml><?xml version="1.0" encoding="utf-8"?>
+<file path=ppt/slides/slide28.xml><?xml version="1.0" encoding="utf-8"?>
 <p:sld xmlns:a="http://schemas.openxmlformats.org/drawingml/2006/main" xmlns:r="http://schemas.openxmlformats.org/officeDocument/2006/relationships" xmlns:p="http://schemas.openxmlformats.org/presentationml/2006/main">
   <p:cSld>
     <p:spTree>
@@ -7630,7 +8056,7 @@
               <a:pPr>
                 <a:defRPr/>
               </a:pPr>
-              <a:t>26</a:t>
+              <a:t>28</a:t>
             </a:fld>
             <a:endParaRPr lang="en-US" dirty="0"/>
           </a:p>
@@ -7865,543 +8291,6 @@
 </p:sld>
 </file>
 
-<file path=ppt/slides/slide27.xml><?xml version="1.0" encoding="utf-8"?>
-<p:sld xmlns:a="http://schemas.openxmlformats.org/drawingml/2006/main" xmlns:r="http://schemas.openxmlformats.org/officeDocument/2006/relationships" xmlns:p="http://schemas.openxmlformats.org/presentationml/2006/main">
-  <p:cSld>
-    <p:spTree>
-      <p:nvGrpSpPr>
-        <p:cNvPr id="1" name=""/>
-        <p:cNvGrpSpPr/>
-        <p:nvPr/>
-      </p:nvGrpSpPr>
-      <p:grpSpPr>
-        <a:xfrm>
-          <a:off x="0" y="0"/>
-          <a:ext cx="0" cy="0"/>
-          <a:chOff x="0" y="0"/>
-          <a:chExt cx="0" cy="0"/>
-        </a:xfrm>
-      </p:grpSpPr>
-      <p:sp>
-        <p:nvSpPr>
-          <p:cNvPr id="2" name="Title 1"/>
-          <p:cNvSpPr>
-            <a:spLocks noGrp="1"/>
-          </p:cNvSpPr>
-          <p:nvPr>
-            <p:ph type="title"/>
-          </p:nvPr>
-        </p:nvSpPr>
-        <p:spPr/>
-        <p:txBody>
-          <a:bodyPr/>
-          <a:lstStyle/>
-          <a:p>
-            <a:r>
-              <a:rPr lang="en-US" dirty="0" smtClean="0"/>
-              <a:t>Participation Grades</a:t>
-            </a:r>
-            <a:endParaRPr lang="en-US" dirty="0"/>
-          </a:p>
-        </p:txBody>
-      </p:sp>
-      <p:sp>
-        <p:nvSpPr>
-          <p:cNvPr id="3" name="Content Placeholder 2"/>
-          <p:cNvSpPr>
-            <a:spLocks noGrp="1"/>
-          </p:cNvSpPr>
-          <p:nvPr>
-            <p:ph idx="1"/>
-          </p:nvPr>
-        </p:nvSpPr>
-        <p:spPr>
-          <a:xfrm>
-            <a:off x="1168401" y="1333500"/>
-            <a:ext cx="6718299" cy="4318000"/>
-          </a:xfrm>
-        </p:spPr>
-        <p:txBody>
-          <a:bodyPr/>
-          <a:lstStyle/>
-          <a:p>
-            <a:pPr marL="0" indent="0"/>
-            <a:r>
-              <a:rPr lang="en-US" sz="4800" b="1" dirty="0" smtClean="0">
-                <a:solidFill>
-                  <a:srgbClr val="006600"/>
-                </a:solidFill>
-              </a:rPr>
-              <a:t>3</a:t>
-            </a:r>
-            <a:r>
-              <a:rPr lang="en-US" sz="4800" dirty="0" smtClean="0"/>
-              <a:t> extraordinary contribution—better than staff solution.</a:t>
-            </a:r>
-          </a:p>
-          <a:p>
-            <a:pPr marL="0" indent="0"/>
-            <a:r>
-              <a:rPr lang="en-US" sz="4800" dirty="0" smtClean="0"/>
-              <a:t>Once or twice for a team during the term.</a:t>
-            </a:r>
-          </a:p>
-          <a:p>
-            <a:pPr marL="0" indent="0"/>
-            <a:r>
-              <a:rPr lang="en-US" sz="4800" dirty="0" smtClean="0">
-                <a:solidFill>
-                  <a:srgbClr val="006600"/>
-                </a:solidFill>
-              </a:rPr>
-              <a:t> </a:t>
-            </a:r>
-          </a:p>
-        </p:txBody>
-      </p:sp>
-      <p:sp>
-        <p:nvSpPr>
-          <p:cNvPr id="4" name="Slide Number Placeholder 3"/>
-          <p:cNvSpPr>
-            <a:spLocks noGrp="1"/>
-          </p:cNvSpPr>
-          <p:nvPr>
-            <p:ph type="sldNum" sz="quarter" idx="4"/>
-          </p:nvPr>
-        </p:nvSpPr>
-        <p:spPr/>
-        <p:txBody>
-          <a:bodyPr/>
-          <a:lstStyle/>
-          <a:p>
-            <a:pPr>
-              <a:defRPr/>
-            </a:pPr>
-            <a:r>
-              <a:rPr lang="en-US" smtClean="0"/>
-              <a:t>coaching.</a:t>
-            </a:r>
-            <a:fld id="{EBFB97A3-F52F-4FD6-B1AC-522A20C95467}" type="slidenum">
-              <a:rPr lang="en-US" smtClean="0"/>
-              <a:pPr>
-                <a:defRPr/>
-              </a:pPr>
-              <a:t>27</a:t>
-            </a:fld>
-            <a:endParaRPr lang="en-US" dirty="0"/>
-          </a:p>
-        </p:txBody>
-      </p:sp>
-    </p:spTree>
-    <p:extLst>
-      <p:ext uri="{BB962C8B-B14F-4D97-AF65-F5344CB8AC3E}">
-        <p14:creationId xmlns:p14="http://schemas.microsoft.com/office/powerpoint/2010/main" val="257503504"/>
-      </p:ext>
-    </p:extLst>
-  </p:cSld>
-  <p:clrMapOvr>
-    <a:masterClrMapping/>
-  </p:clrMapOvr>
-  <mc:AlternateContent xmlns:mc="http://schemas.openxmlformats.org/markup-compatibility/2006" xmlns:p14="http://schemas.microsoft.com/office/powerpoint/2010/main">
-    <mc:Choice Requires="p14">
-      <p:transition spd="slow" p14:dur="900" advClick="0">
-        <p:fade/>
-      </p:transition>
-    </mc:Choice>
-    <mc:Fallback xmlns="">
-      <p:transition xmlns:p14="http://schemas.microsoft.com/office/powerpoint/2010/main" spd="slow" advClick="0">
-        <p:fade/>
-      </p:transition>
-    </mc:Fallback>
-  </mc:AlternateContent>
-  <p:timing>
-    <p:tnLst>
-      <p:par>
-        <p:cTn xmlns:p14="http://schemas.microsoft.com/office/powerpoint/2010/main" id="1" dur="indefinite" restart="never" nodeType="tmRoot">
-          <p:childTnLst>
-            <p:seq concurrent="1" nextAc="seek">
-              <p:cTn id="2" dur="indefinite" nodeType="mainSeq">
-                <p:childTnLst>
-                  <p:par>
-                    <p:cTn id="3" fill="hold">
-                      <p:stCondLst>
-                        <p:cond delay="indefinite"/>
-                      </p:stCondLst>
-                      <p:childTnLst>
-                        <p:par>
-                          <p:cTn id="4" fill="hold">
-                            <p:stCondLst>
-                              <p:cond delay="0"/>
-                            </p:stCondLst>
-                            <p:childTnLst>
-                              <p:par>
-                                <p:cTn id="5" presetID="9" presetClass="entr" presetSubtype="0" fill="hold" nodeType="clickEffect">
-                                  <p:stCondLst>
-                                    <p:cond delay="0"/>
-                                  </p:stCondLst>
-                                  <p:childTnLst>
-                                    <p:set>
-                                      <p:cBhvr>
-                                        <p:cTn id="6" dur="1" fill="hold">
-                                          <p:stCondLst>
-                                            <p:cond delay="0"/>
-                                          </p:stCondLst>
-                                        </p:cTn>
-                                        <p:tgtEl>
-                                          <p:spTgt spid="3">
-                                            <p:txEl>
-                                              <p:pRg st="1" end="1"/>
-                                            </p:txEl>
-                                          </p:spTgt>
-                                        </p:tgtEl>
-                                        <p:attrNameLst>
-                                          <p:attrName>style.visibility</p:attrName>
-                                        </p:attrNameLst>
-                                      </p:cBhvr>
-                                      <p:to>
-                                        <p:strVal val="visible"/>
-                                      </p:to>
-                                    </p:set>
-                                    <p:animEffect transition="in" filter="dissolve">
-                                      <p:cBhvr>
-                                        <p:cTn id="7" dur="500"/>
-                                        <p:tgtEl>
-                                          <p:spTgt spid="3">
-                                            <p:txEl>
-                                              <p:pRg st="1" end="1"/>
-                                            </p:txEl>
-                                          </p:spTgt>
-                                        </p:tgtEl>
-                                      </p:cBhvr>
-                                    </p:animEffect>
-                                  </p:childTnLst>
-                                </p:cTn>
-                              </p:par>
-                            </p:childTnLst>
-                          </p:cTn>
-                        </p:par>
-                      </p:childTnLst>
-                    </p:cTn>
-                  </p:par>
-                </p:childTnLst>
-              </p:cTn>
-              <p:prevCondLst>
-                <p:cond evt="onPrev" delay="0">
-                  <p:tgtEl>
-                    <p:sldTgt/>
-                  </p:tgtEl>
-                </p:cond>
-              </p:prevCondLst>
-              <p:nextCondLst>
-                <p:cond evt="onNext" delay="0">
-                  <p:tgtEl>
-                    <p:sldTgt/>
-                  </p:tgtEl>
-                </p:cond>
-              </p:nextCondLst>
-            </p:seq>
-          </p:childTnLst>
-        </p:cTn>
-      </p:par>
-    </p:tnLst>
-  </p:timing>
-</p:sld>
-</file>
-
-<file path=ppt/slides/slide28.xml><?xml version="1.0" encoding="utf-8"?>
-<p:sld xmlns:a="http://schemas.openxmlformats.org/drawingml/2006/main" xmlns:r="http://schemas.openxmlformats.org/officeDocument/2006/relationships" xmlns:p="http://schemas.openxmlformats.org/presentationml/2006/main">
-  <p:cSld>
-    <p:spTree>
-      <p:nvGrpSpPr>
-        <p:cNvPr id="1" name=""/>
-        <p:cNvGrpSpPr/>
-        <p:nvPr/>
-      </p:nvGrpSpPr>
-      <p:grpSpPr>
-        <a:xfrm>
-          <a:off x="0" y="0"/>
-          <a:ext cx="0" cy="0"/>
-          <a:chOff x="0" y="0"/>
-          <a:chExt cx="0" cy="0"/>
-        </a:xfrm>
-      </p:grpSpPr>
-      <p:sp>
-        <p:nvSpPr>
-          <p:cNvPr id="2" name="Title 1"/>
-          <p:cNvSpPr>
-            <a:spLocks noGrp="1"/>
-          </p:cNvSpPr>
-          <p:nvPr>
-            <p:ph type="title"/>
-          </p:nvPr>
-        </p:nvSpPr>
-        <p:spPr/>
-        <p:txBody>
-          <a:bodyPr/>
-          <a:lstStyle/>
-          <a:p>
-            <a:r>
-              <a:rPr lang="en-US" dirty="0" smtClean="0"/>
-              <a:t>Participation Grades</a:t>
-            </a:r>
-            <a:endParaRPr lang="en-US" dirty="0"/>
-          </a:p>
-        </p:txBody>
-      </p:sp>
-      <p:sp>
-        <p:nvSpPr>
-          <p:cNvPr id="3" name="Content Placeholder 2"/>
-          <p:cNvSpPr>
-            <a:spLocks noGrp="1"/>
-          </p:cNvSpPr>
-          <p:nvPr>
-            <p:ph idx="1"/>
-          </p:nvPr>
-        </p:nvSpPr>
-        <p:spPr>
-          <a:xfrm>
-            <a:off x="431801" y="1447800"/>
-            <a:ext cx="8305800" cy="4953000"/>
-          </a:xfrm>
-        </p:spPr>
-        <p:txBody>
-          <a:bodyPr/>
-          <a:lstStyle/>
-          <a:p>
-            <a:pPr marL="0" indent="0"/>
-            <a:r>
-              <a:rPr lang="en-US" sz="4800" dirty="0" smtClean="0">
-                <a:solidFill>
-                  <a:srgbClr val="BB0FAB"/>
-                </a:solidFill>
-              </a:rPr>
-              <a:t>  Email students</a:t>
-            </a:r>
-            <a:r>
-              <a:rPr lang="en-US" sz="4800" dirty="0" smtClean="0">
-                <a:solidFill>
-                  <a:srgbClr val="000000"/>
-                </a:solidFill>
-              </a:rPr>
-              <a:t> </a:t>
-            </a:r>
-            <a:r>
-              <a:rPr lang="en-US" sz="4800" dirty="0" smtClean="0">
-                <a:solidFill>
-                  <a:srgbClr val="BB0FAB"/>
-                </a:solidFill>
-              </a:rPr>
-              <a:t>for    </a:t>
-            </a:r>
-          </a:p>
-          <a:p>
-            <a:pPr marL="0" indent="0"/>
-            <a:r>
-              <a:rPr lang="en-US" sz="4800" dirty="0">
-                <a:solidFill>
-                  <a:srgbClr val="BB0FAB"/>
-                </a:solidFill>
-              </a:rPr>
-              <a:t> </a:t>
-            </a:r>
-            <a:r>
-              <a:rPr lang="en-US" sz="4800" dirty="0" smtClean="0">
-                <a:solidFill>
-                  <a:srgbClr val="BB0FAB"/>
-                </a:solidFill>
-              </a:rPr>
-              <a:t> unexplained absence</a:t>
-            </a:r>
-            <a:r>
-              <a:rPr lang="en-US" sz="4800" dirty="0" smtClean="0">
-                <a:solidFill>
-                  <a:srgbClr val="000000"/>
-                </a:solidFill>
-              </a:rPr>
-              <a:t>:</a:t>
-            </a:r>
-          </a:p>
-          <a:p>
-            <a:pPr marL="0" indent="0"/>
-            <a:r>
-              <a:rPr lang="en-US" sz="4800" dirty="0" smtClean="0">
-                <a:solidFill>
-                  <a:srgbClr val="000000"/>
-                </a:solidFill>
-              </a:rPr>
-              <a:t>“I noticed you were absent today.  Hope you are OK.  Look forward to seeing at next class.”  </a:t>
-            </a:r>
-            <a:r>
-              <a:rPr lang="en-US" sz="4800" dirty="0" smtClean="0">
-                <a:solidFill>
-                  <a:srgbClr val="008000"/>
-                </a:solidFill>
-              </a:rPr>
-              <a:t>cc instructors.</a:t>
-            </a:r>
-          </a:p>
-          <a:p>
-            <a:pPr marL="0" indent="0"/>
-            <a:r>
-              <a:rPr lang="en-US" sz="4800" dirty="0" smtClean="0">
-                <a:solidFill>
-                  <a:srgbClr val="006600"/>
-                </a:solidFill>
-              </a:rPr>
-              <a:t> </a:t>
-            </a:r>
-          </a:p>
-        </p:txBody>
-      </p:sp>
-      <p:sp>
-        <p:nvSpPr>
-          <p:cNvPr id="4" name="Slide Number Placeholder 3"/>
-          <p:cNvSpPr>
-            <a:spLocks noGrp="1"/>
-          </p:cNvSpPr>
-          <p:nvPr>
-            <p:ph type="sldNum" sz="quarter" idx="4"/>
-          </p:nvPr>
-        </p:nvSpPr>
-        <p:spPr/>
-        <p:txBody>
-          <a:bodyPr/>
-          <a:lstStyle/>
-          <a:p>
-            <a:pPr>
-              <a:defRPr/>
-            </a:pPr>
-            <a:r>
-              <a:rPr lang="en-US" smtClean="0"/>
-              <a:t>coaching.</a:t>
-            </a:r>
-            <a:fld id="{EBFB97A3-F52F-4FD6-B1AC-522A20C95467}" type="slidenum">
-              <a:rPr lang="en-US" smtClean="0"/>
-              <a:pPr>
-                <a:defRPr/>
-              </a:pPr>
-              <a:t>28</a:t>
-            </a:fld>
-            <a:endParaRPr lang="en-US" dirty="0"/>
-          </a:p>
-        </p:txBody>
-      </p:sp>
-    </p:spTree>
-    <p:extLst>
-      <p:ext uri="{BB962C8B-B14F-4D97-AF65-F5344CB8AC3E}">
-        <p14:creationId xmlns:p14="http://schemas.microsoft.com/office/powerpoint/2010/main" val="59029298"/>
-      </p:ext>
-    </p:extLst>
-  </p:cSld>
-  <p:clrMapOvr>
-    <a:masterClrMapping/>
-  </p:clrMapOvr>
-  <mc:AlternateContent xmlns:mc="http://schemas.openxmlformats.org/markup-compatibility/2006" xmlns:p14="http://schemas.microsoft.com/office/powerpoint/2010/main">
-    <mc:Choice Requires="p14">
-      <p:transition spd="slow" p14:dur="900" advClick="0">
-        <p:fade/>
-      </p:transition>
-    </mc:Choice>
-    <mc:Fallback xmlns="">
-      <p:transition xmlns:p14="http://schemas.microsoft.com/office/powerpoint/2010/main" spd="slow" advClick="0">
-        <p:fade/>
-      </p:transition>
-    </mc:Fallback>
-  </mc:AlternateContent>
-  <p:timing>
-    <p:tnLst>
-      <p:par>
-        <p:cTn xmlns:p14="http://schemas.microsoft.com/office/powerpoint/2010/main" id="1" dur="indefinite" restart="never" nodeType="tmRoot">
-          <p:childTnLst>
-            <p:seq concurrent="1" nextAc="seek">
-              <p:cTn id="2" dur="indefinite" nodeType="mainSeq">
-                <p:childTnLst>
-                  <p:par>
-                    <p:cTn id="3" fill="hold">
-                      <p:stCondLst>
-                        <p:cond delay="indefinite"/>
-                      </p:stCondLst>
-                      <p:childTnLst>
-                        <p:par>
-                          <p:cTn id="4" fill="hold">
-                            <p:stCondLst>
-                              <p:cond delay="0"/>
-                            </p:stCondLst>
-                            <p:childTnLst>
-                              <p:par>
-                                <p:cTn id="5" presetID="9" presetClass="entr" presetSubtype="0" fill="hold" nodeType="clickEffect">
-                                  <p:stCondLst>
-                                    <p:cond delay="0"/>
-                                  </p:stCondLst>
-                                  <p:childTnLst>
-                                    <p:set>
-                                      <p:cBhvr>
-                                        <p:cTn id="6" dur="1" fill="hold">
-                                          <p:stCondLst>
-                                            <p:cond delay="0"/>
-                                          </p:stCondLst>
-                                        </p:cTn>
-                                        <p:tgtEl>
-                                          <p:spTgt spid="3">
-                                            <p:txEl>
-                                              <p:pRg st="2" end="2"/>
-                                            </p:txEl>
-                                          </p:spTgt>
-                                        </p:tgtEl>
-                                        <p:attrNameLst>
-                                          <p:attrName>style.visibility</p:attrName>
-                                        </p:attrNameLst>
-                                      </p:cBhvr>
-                                      <p:to>
-                                        <p:strVal val="visible"/>
-                                      </p:to>
-                                    </p:set>
-                                    <p:animEffect transition="in" filter="dissolve">
-                                      <p:cBhvr>
-                                        <p:cTn id="7" dur="500"/>
-                                        <p:tgtEl>
-                                          <p:spTgt spid="3">
-                                            <p:txEl>
-                                              <p:pRg st="2" end="2"/>
-                                            </p:txEl>
-                                          </p:spTgt>
-                                        </p:tgtEl>
-                                      </p:cBhvr>
-                                    </p:animEffect>
-                                  </p:childTnLst>
-                                </p:cTn>
-                              </p:par>
-                            </p:childTnLst>
-                          </p:cTn>
-                        </p:par>
-                      </p:childTnLst>
-                    </p:cTn>
-                  </p:par>
-                </p:childTnLst>
-              </p:cTn>
-              <p:prevCondLst>
-                <p:cond evt="onPrev" delay="0">
-                  <p:tgtEl>
-                    <p:sldTgt/>
-                  </p:tgtEl>
-                </p:cond>
-              </p:prevCondLst>
-              <p:nextCondLst>
-                <p:cond evt="onNext" delay="0">
-                  <p:tgtEl>
-                    <p:sldTgt/>
-                  </p:tgtEl>
-                </p:cond>
-              </p:nextCondLst>
-            </p:seq>
-          </p:childTnLst>
-        </p:cTn>
-      </p:par>
-    </p:tnLst>
-  </p:timing>
-</p:sld>
-</file>
-
 <file path=ppt/slides/slide29.xml><?xml version="1.0" encoding="utf-8"?>
 <p:sld xmlns:a="http://schemas.openxmlformats.org/drawingml/2006/main" xmlns:r="http://schemas.openxmlformats.org/officeDocument/2006/relationships" xmlns:p="http://schemas.openxmlformats.org/presentationml/2006/main">
   <p:cSld>
@@ -8454,8 +8343,8 @@
         </p:nvSpPr>
         <p:spPr>
           <a:xfrm>
-            <a:off x="431800" y="1384300"/>
-            <a:ext cx="8343899" cy="4229100"/>
+            <a:off x="1168401" y="1333500"/>
+            <a:ext cx="6718299" cy="4318000"/>
           </a:xfrm>
         </p:spPr>
         <p:txBody>
@@ -8464,29 +8353,27 @@
           <a:p>
             <a:pPr marL="0" indent="0"/>
             <a:r>
-              <a:rPr lang="en-US" sz="4800" dirty="0" smtClean="0">
+              <a:rPr lang="en-US" sz="4800" b="1" dirty="0" smtClean="0">
                 <a:solidFill>
-                  <a:srgbClr val="BB0FAB"/>
+                  <a:srgbClr val="006600"/>
                 </a:solidFill>
               </a:rPr>
-              <a:t>Tell students who get a 1:</a:t>
-            </a:r>
-            <a:endParaRPr lang="en-US" sz="4800" dirty="0" smtClean="0">
-              <a:solidFill>
-                <a:srgbClr val="000000"/>
-              </a:solidFill>
-            </a:endParaRPr>
+              <a:t>3</a:t>
+            </a:r>
+            <a:r>
+              <a:rPr lang="en-US" sz="4800" dirty="0" smtClean="0"/>
+              <a:t> extraordinary contribution—better than staff solution.</a:t>
+            </a:r>
           </a:p>
           <a:p>
             <a:pPr marL="0" indent="0"/>
             <a:r>
-              <a:rPr lang="en-US" sz="4800" dirty="0" smtClean="0">
-                <a:solidFill>
-                  <a:srgbClr val="000000"/>
-                </a:solidFill>
-              </a:rPr>
-              <a:t>“Given your team activity today, I’m not comfortable giving you full credit for participation.”</a:t>
-            </a:r>
+              <a:rPr lang="en-US" sz="4800" dirty="0" smtClean="0"/>
+              <a:t>Once or twice for a team during the term.</a:t>
+            </a:r>
+          </a:p>
+          <a:p>
+            <a:pPr marL="0" indent="0"/>
             <a:r>
               <a:rPr lang="en-US" sz="4800" dirty="0" smtClean="0">
                 <a:solidFill>
@@ -8534,7 +8421,7 @@
     </p:spTree>
     <p:extLst>
       <p:ext uri="{BB962C8B-B14F-4D97-AF65-F5344CB8AC3E}">
-        <p14:creationId xmlns:p14="http://schemas.microsoft.com/office/powerpoint/2010/main" val="1669929539"/>
+        <p14:creationId xmlns:p14="http://schemas.microsoft.com/office/powerpoint/2010/main" val="257503504"/>
       </p:ext>
     </p:extLst>
   </p:cSld>
@@ -8949,6 +8836,300 @@
         </p:nvSpPr>
         <p:spPr>
           <a:xfrm>
+            <a:off x="431801" y="1447800"/>
+            <a:ext cx="8305800" cy="4953000"/>
+          </a:xfrm>
+        </p:spPr>
+        <p:txBody>
+          <a:bodyPr/>
+          <a:lstStyle/>
+          <a:p>
+            <a:pPr marL="0" indent="0"/>
+            <a:r>
+              <a:rPr lang="en-US" sz="4800" dirty="0" smtClean="0">
+                <a:solidFill>
+                  <a:srgbClr val="BB0FAB"/>
+                </a:solidFill>
+              </a:rPr>
+              <a:t>  Email students</a:t>
+            </a:r>
+            <a:r>
+              <a:rPr lang="en-US" sz="4800" dirty="0" smtClean="0">
+                <a:solidFill>
+                  <a:srgbClr val="000000"/>
+                </a:solidFill>
+              </a:rPr>
+              <a:t> </a:t>
+            </a:r>
+            <a:r>
+              <a:rPr lang="en-US" sz="4800" dirty="0" smtClean="0">
+                <a:solidFill>
+                  <a:srgbClr val="BB0FAB"/>
+                </a:solidFill>
+              </a:rPr>
+              <a:t>for    </a:t>
+            </a:r>
+          </a:p>
+          <a:p>
+            <a:pPr marL="0" indent="0"/>
+            <a:r>
+              <a:rPr lang="en-US" sz="4800" dirty="0">
+                <a:solidFill>
+                  <a:srgbClr val="BB0FAB"/>
+                </a:solidFill>
+              </a:rPr>
+              <a:t> </a:t>
+            </a:r>
+            <a:r>
+              <a:rPr lang="en-US" sz="4800" dirty="0" smtClean="0">
+                <a:solidFill>
+                  <a:srgbClr val="BB0FAB"/>
+                </a:solidFill>
+              </a:rPr>
+              <a:t> unexplained absence</a:t>
+            </a:r>
+            <a:r>
+              <a:rPr lang="en-US" sz="4800" dirty="0" smtClean="0">
+                <a:solidFill>
+                  <a:srgbClr val="000000"/>
+                </a:solidFill>
+              </a:rPr>
+              <a:t>:</a:t>
+            </a:r>
+          </a:p>
+          <a:p>
+            <a:pPr marL="0" indent="0"/>
+            <a:r>
+              <a:rPr lang="en-US" sz="4800" dirty="0" smtClean="0">
+                <a:solidFill>
+                  <a:srgbClr val="000000"/>
+                </a:solidFill>
+              </a:rPr>
+              <a:t>“I noticed you were absent today.  Hope you are OK.  Look forward to seeing at next class.”  </a:t>
+            </a:r>
+            <a:r>
+              <a:rPr lang="en-US" sz="4800" dirty="0" smtClean="0">
+                <a:solidFill>
+                  <a:srgbClr val="008000"/>
+                </a:solidFill>
+              </a:rPr>
+              <a:t>cc instructors.</a:t>
+            </a:r>
+          </a:p>
+          <a:p>
+            <a:pPr marL="0" indent="0"/>
+            <a:r>
+              <a:rPr lang="en-US" sz="4800" dirty="0" smtClean="0">
+                <a:solidFill>
+                  <a:srgbClr val="006600"/>
+                </a:solidFill>
+              </a:rPr>
+              <a:t> </a:t>
+            </a:r>
+          </a:p>
+        </p:txBody>
+      </p:sp>
+      <p:sp>
+        <p:nvSpPr>
+          <p:cNvPr id="4" name="Slide Number Placeholder 3"/>
+          <p:cNvSpPr>
+            <a:spLocks noGrp="1"/>
+          </p:cNvSpPr>
+          <p:nvPr>
+            <p:ph type="sldNum" sz="quarter" idx="4"/>
+          </p:nvPr>
+        </p:nvSpPr>
+        <p:spPr/>
+        <p:txBody>
+          <a:bodyPr/>
+          <a:lstStyle/>
+          <a:p>
+            <a:pPr>
+              <a:defRPr/>
+            </a:pPr>
+            <a:r>
+              <a:rPr lang="en-US" smtClean="0"/>
+              <a:t>coaching.</a:t>
+            </a:r>
+            <a:fld id="{EBFB97A3-F52F-4FD6-B1AC-522A20C95467}" type="slidenum">
+              <a:rPr lang="en-US" smtClean="0"/>
+              <a:pPr>
+                <a:defRPr/>
+              </a:pPr>
+              <a:t>30</a:t>
+            </a:fld>
+            <a:endParaRPr lang="en-US" dirty="0"/>
+          </a:p>
+        </p:txBody>
+      </p:sp>
+    </p:spTree>
+    <p:extLst>
+      <p:ext uri="{BB962C8B-B14F-4D97-AF65-F5344CB8AC3E}">
+        <p14:creationId xmlns:p14="http://schemas.microsoft.com/office/powerpoint/2010/main" val="59029298"/>
+      </p:ext>
+    </p:extLst>
+  </p:cSld>
+  <p:clrMapOvr>
+    <a:masterClrMapping/>
+  </p:clrMapOvr>
+  <mc:AlternateContent xmlns:mc="http://schemas.openxmlformats.org/markup-compatibility/2006" xmlns:p14="http://schemas.microsoft.com/office/powerpoint/2010/main">
+    <mc:Choice Requires="p14">
+      <p:transition spd="slow" p14:dur="900" advClick="0">
+        <p:fade/>
+      </p:transition>
+    </mc:Choice>
+    <mc:Fallback xmlns="">
+      <p:transition xmlns:p14="http://schemas.microsoft.com/office/powerpoint/2010/main" spd="slow" advClick="0">
+        <p:fade/>
+      </p:transition>
+    </mc:Fallback>
+  </mc:AlternateContent>
+  <p:timing>
+    <p:tnLst>
+      <p:par>
+        <p:cTn xmlns:p14="http://schemas.microsoft.com/office/powerpoint/2010/main" id="1" dur="indefinite" restart="never" nodeType="tmRoot">
+          <p:childTnLst>
+            <p:seq concurrent="1" nextAc="seek">
+              <p:cTn id="2" dur="indefinite" nodeType="mainSeq">
+                <p:childTnLst>
+                  <p:par>
+                    <p:cTn id="3" fill="hold">
+                      <p:stCondLst>
+                        <p:cond delay="indefinite"/>
+                      </p:stCondLst>
+                      <p:childTnLst>
+                        <p:par>
+                          <p:cTn id="4" fill="hold">
+                            <p:stCondLst>
+                              <p:cond delay="0"/>
+                            </p:stCondLst>
+                            <p:childTnLst>
+                              <p:par>
+                                <p:cTn id="5" presetID="9" presetClass="entr" presetSubtype="0" fill="hold" nodeType="clickEffect">
+                                  <p:stCondLst>
+                                    <p:cond delay="0"/>
+                                  </p:stCondLst>
+                                  <p:childTnLst>
+                                    <p:set>
+                                      <p:cBhvr>
+                                        <p:cTn id="6" dur="1" fill="hold">
+                                          <p:stCondLst>
+                                            <p:cond delay="0"/>
+                                          </p:stCondLst>
+                                        </p:cTn>
+                                        <p:tgtEl>
+                                          <p:spTgt spid="3">
+                                            <p:txEl>
+                                              <p:pRg st="2" end="2"/>
+                                            </p:txEl>
+                                          </p:spTgt>
+                                        </p:tgtEl>
+                                        <p:attrNameLst>
+                                          <p:attrName>style.visibility</p:attrName>
+                                        </p:attrNameLst>
+                                      </p:cBhvr>
+                                      <p:to>
+                                        <p:strVal val="visible"/>
+                                      </p:to>
+                                    </p:set>
+                                    <p:animEffect transition="in" filter="dissolve">
+                                      <p:cBhvr>
+                                        <p:cTn id="7" dur="500"/>
+                                        <p:tgtEl>
+                                          <p:spTgt spid="3">
+                                            <p:txEl>
+                                              <p:pRg st="2" end="2"/>
+                                            </p:txEl>
+                                          </p:spTgt>
+                                        </p:tgtEl>
+                                      </p:cBhvr>
+                                    </p:animEffect>
+                                  </p:childTnLst>
+                                </p:cTn>
+                              </p:par>
+                            </p:childTnLst>
+                          </p:cTn>
+                        </p:par>
+                      </p:childTnLst>
+                    </p:cTn>
+                  </p:par>
+                </p:childTnLst>
+              </p:cTn>
+              <p:prevCondLst>
+                <p:cond evt="onPrev" delay="0">
+                  <p:tgtEl>
+                    <p:sldTgt/>
+                  </p:tgtEl>
+                </p:cond>
+              </p:prevCondLst>
+              <p:nextCondLst>
+                <p:cond evt="onNext" delay="0">
+                  <p:tgtEl>
+                    <p:sldTgt/>
+                  </p:tgtEl>
+                </p:cond>
+              </p:nextCondLst>
+            </p:seq>
+          </p:childTnLst>
+        </p:cTn>
+      </p:par>
+    </p:tnLst>
+  </p:timing>
+</p:sld>
+</file>
+
+<file path=ppt/slides/slide31.xml><?xml version="1.0" encoding="utf-8"?>
+<p:sld xmlns:a="http://schemas.openxmlformats.org/drawingml/2006/main" xmlns:r="http://schemas.openxmlformats.org/officeDocument/2006/relationships" xmlns:p="http://schemas.openxmlformats.org/presentationml/2006/main">
+  <p:cSld>
+    <p:spTree>
+      <p:nvGrpSpPr>
+        <p:cNvPr id="1" name=""/>
+        <p:cNvGrpSpPr/>
+        <p:nvPr/>
+      </p:nvGrpSpPr>
+      <p:grpSpPr>
+        <a:xfrm>
+          <a:off x="0" y="0"/>
+          <a:ext cx="0" cy="0"/>
+          <a:chOff x="0" y="0"/>
+          <a:chExt cx="0" cy="0"/>
+        </a:xfrm>
+      </p:grpSpPr>
+      <p:sp>
+        <p:nvSpPr>
+          <p:cNvPr id="2" name="Title 1"/>
+          <p:cNvSpPr>
+            <a:spLocks noGrp="1"/>
+          </p:cNvSpPr>
+          <p:nvPr>
+            <p:ph type="title"/>
+          </p:nvPr>
+        </p:nvSpPr>
+        <p:spPr/>
+        <p:txBody>
+          <a:bodyPr/>
+          <a:lstStyle/>
+          <a:p>
+            <a:r>
+              <a:rPr lang="en-US" dirty="0" smtClean="0"/>
+              <a:t>Participation Grades</a:t>
+            </a:r>
+            <a:endParaRPr lang="en-US" dirty="0"/>
+          </a:p>
+        </p:txBody>
+      </p:sp>
+      <p:sp>
+        <p:nvSpPr>
+          <p:cNvPr id="3" name="Content Placeholder 2"/>
+          <p:cNvSpPr>
+            <a:spLocks noGrp="1"/>
+          </p:cNvSpPr>
+          <p:nvPr>
+            <p:ph idx="1"/>
+          </p:nvPr>
+        </p:nvSpPr>
+        <p:spPr>
+          <a:xfrm>
             <a:off x="431800" y="1384300"/>
             <a:ext cx="8343899" cy="4229100"/>
           </a:xfrm>
@@ -8975,6 +9156,251 @@
           <a:p>
             <a:pPr marL="0" indent="0"/>
             <a:r>
+              <a:rPr lang="en-US" sz="4800" dirty="0" smtClean="0">
+                <a:solidFill>
+                  <a:srgbClr val="000000"/>
+                </a:solidFill>
+              </a:rPr>
+              <a:t>“Given your team activity today, I’m not comfortable giving you full credit for participation.”</a:t>
+            </a:r>
+            <a:r>
+              <a:rPr lang="en-US" sz="4800" dirty="0" smtClean="0">
+                <a:solidFill>
+                  <a:srgbClr val="006600"/>
+                </a:solidFill>
+              </a:rPr>
+              <a:t> </a:t>
+            </a:r>
+          </a:p>
+        </p:txBody>
+      </p:sp>
+      <p:sp>
+        <p:nvSpPr>
+          <p:cNvPr id="4" name="Slide Number Placeholder 3"/>
+          <p:cNvSpPr>
+            <a:spLocks noGrp="1"/>
+          </p:cNvSpPr>
+          <p:nvPr>
+            <p:ph type="sldNum" sz="quarter" idx="4"/>
+          </p:nvPr>
+        </p:nvSpPr>
+        <p:spPr/>
+        <p:txBody>
+          <a:bodyPr/>
+          <a:lstStyle/>
+          <a:p>
+            <a:pPr>
+              <a:defRPr/>
+            </a:pPr>
+            <a:r>
+              <a:rPr lang="en-US" smtClean="0"/>
+              <a:t>coaching.</a:t>
+            </a:r>
+            <a:fld id="{EBFB97A3-F52F-4FD6-B1AC-522A20C95467}" type="slidenum">
+              <a:rPr lang="en-US" smtClean="0"/>
+              <a:pPr>
+                <a:defRPr/>
+              </a:pPr>
+              <a:t>31</a:t>
+            </a:fld>
+            <a:endParaRPr lang="en-US" dirty="0"/>
+          </a:p>
+        </p:txBody>
+      </p:sp>
+    </p:spTree>
+    <p:extLst>
+      <p:ext uri="{BB962C8B-B14F-4D97-AF65-F5344CB8AC3E}">
+        <p14:creationId xmlns:p14="http://schemas.microsoft.com/office/powerpoint/2010/main" val="1669929539"/>
+      </p:ext>
+    </p:extLst>
+  </p:cSld>
+  <p:clrMapOvr>
+    <a:masterClrMapping/>
+  </p:clrMapOvr>
+  <mc:AlternateContent xmlns:mc="http://schemas.openxmlformats.org/markup-compatibility/2006" xmlns:p14="http://schemas.microsoft.com/office/powerpoint/2010/main">
+    <mc:Choice Requires="p14">
+      <p:transition spd="slow" p14:dur="900" advClick="0">
+        <p:fade/>
+      </p:transition>
+    </mc:Choice>
+    <mc:Fallback xmlns="">
+      <p:transition xmlns:p14="http://schemas.microsoft.com/office/powerpoint/2010/main" spd="slow" advClick="0">
+        <p:fade/>
+      </p:transition>
+    </mc:Fallback>
+  </mc:AlternateContent>
+  <p:timing>
+    <p:tnLst>
+      <p:par>
+        <p:cTn xmlns:p14="http://schemas.microsoft.com/office/powerpoint/2010/main" id="1" dur="indefinite" restart="never" nodeType="tmRoot">
+          <p:childTnLst>
+            <p:seq concurrent="1" nextAc="seek">
+              <p:cTn id="2" dur="indefinite" nodeType="mainSeq">
+                <p:childTnLst>
+                  <p:par>
+                    <p:cTn id="3" fill="hold">
+                      <p:stCondLst>
+                        <p:cond delay="indefinite"/>
+                      </p:stCondLst>
+                      <p:childTnLst>
+                        <p:par>
+                          <p:cTn id="4" fill="hold">
+                            <p:stCondLst>
+                              <p:cond delay="0"/>
+                            </p:stCondLst>
+                            <p:childTnLst>
+                              <p:par>
+                                <p:cTn id="5" presetID="9" presetClass="entr" presetSubtype="0" fill="hold" nodeType="clickEffect">
+                                  <p:stCondLst>
+                                    <p:cond delay="0"/>
+                                  </p:stCondLst>
+                                  <p:childTnLst>
+                                    <p:set>
+                                      <p:cBhvr>
+                                        <p:cTn id="6" dur="1" fill="hold">
+                                          <p:stCondLst>
+                                            <p:cond delay="0"/>
+                                          </p:stCondLst>
+                                        </p:cTn>
+                                        <p:tgtEl>
+                                          <p:spTgt spid="3">
+                                            <p:txEl>
+                                              <p:pRg st="1" end="1"/>
+                                            </p:txEl>
+                                          </p:spTgt>
+                                        </p:tgtEl>
+                                        <p:attrNameLst>
+                                          <p:attrName>style.visibility</p:attrName>
+                                        </p:attrNameLst>
+                                      </p:cBhvr>
+                                      <p:to>
+                                        <p:strVal val="visible"/>
+                                      </p:to>
+                                    </p:set>
+                                    <p:animEffect transition="in" filter="dissolve">
+                                      <p:cBhvr>
+                                        <p:cTn id="7" dur="500"/>
+                                        <p:tgtEl>
+                                          <p:spTgt spid="3">
+                                            <p:txEl>
+                                              <p:pRg st="1" end="1"/>
+                                            </p:txEl>
+                                          </p:spTgt>
+                                        </p:tgtEl>
+                                      </p:cBhvr>
+                                    </p:animEffect>
+                                  </p:childTnLst>
+                                </p:cTn>
+                              </p:par>
+                            </p:childTnLst>
+                          </p:cTn>
+                        </p:par>
+                      </p:childTnLst>
+                    </p:cTn>
+                  </p:par>
+                </p:childTnLst>
+              </p:cTn>
+              <p:prevCondLst>
+                <p:cond evt="onPrev" delay="0">
+                  <p:tgtEl>
+                    <p:sldTgt/>
+                  </p:tgtEl>
+                </p:cond>
+              </p:prevCondLst>
+              <p:nextCondLst>
+                <p:cond evt="onNext" delay="0">
+                  <p:tgtEl>
+                    <p:sldTgt/>
+                  </p:tgtEl>
+                </p:cond>
+              </p:nextCondLst>
+            </p:seq>
+          </p:childTnLst>
+        </p:cTn>
+      </p:par>
+    </p:tnLst>
+  </p:timing>
+</p:sld>
+</file>
+
+<file path=ppt/slides/slide32.xml><?xml version="1.0" encoding="utf-8"?>
+<p:sld xmlns:a="http://schemas.openxmlformats.org/drawingml/2006/main" xmlns:r="http://schemas.openxmlformats.org/officeDocument/2006/relationships" xmlns:p="http://schemas.openxmlformats.org/presentationml/2006/main">
+  <p:cSld>
+    <p:spTree>
+      <p:nvGrpSpPr>
+        <p:cNvPr id="1" name=""/>
+        <p:cNvGrpSpPr/>
+        <p:nvPr/>
+      </p:nvGrpSpPr>
+      <p:grpSpPr>
+        <a:xfrm>
+          <a:off x="0" y="0"/>
+          <a:ext cx="0" cy="0"/>
+          <a:chOff x="0" y="0"/>
+          <a:chExt cx="0" cy="0"/>
+        </a:xfrm>
+      </p:grpSpPr>
+      <p:sp>
+        <p:nvSpPr>
+          <p:cNvPr id="2" name="Title 1"/>
+          <p:cNvSpPr>
+            <a:spLocks noGrp="1"/>
+          </p:cNvSpPr>
+          <p:nvPr>
+            <p:ph type="title"/>
+          </p:nvPr>
+        </p:nvSpPr>
+        <p:spPr/>
+        <p:txBody>
+          <a:bodyPr/>
+          <a:lstStyle/>
+          <a:p>
+            <a:r>
+              <a:rPr lang="en-US" dirty="0" smtClean="0"/>
+              <a:t>Participation Grades</a:t>
+            </a:r>
+            <a:endParaRPr lang="en-US" dirty="0"/>
+          </a:p>
+        </p:txBody>
+      </p:sp>
+      <p:sp>
+        <p:nvSpPr>
+          <p:cNvPr id="3" name="Content Placeholder 2"/>
+          <p:cNvSpPr>
+            <a:spLocks noGrp="1"/>
+          </p:cNvSpPr>
+          <p:nvPr>
+            <p:ph idx="1"/>
+          </p:nvPr>
+        </p:nvSpPr>
+        <p:spPr>
+          <a:xfrm>
+            <a:off x="431800" y="1384300"/>
+            <a:ext cx="8343899" cy="4229100"/>
+          </a:xfrm>
+        </p:spPr>
+        <p:txBody>
+          <a:bodyPr/>
+          <a:lstStyle/>
+          <a:p>
+            <a:pPr marL="0" indent="0"/>
+            <a:r>
+              <a:rPr lang="en-US" sz="4800" dirty="0" smtClean="0">
+                <a:solidFill>
+                  <a:srgbClr val="BB0FAB"/>
+                </a:solidFill>
+              </a:rPr>
+              <a:t>Tell students who get a 1:</a:t>
+            </a:r>
+            <a:endParaRPr lang="en-US" sz="4800" dirty="0" smtClean="0">
+              <a:solidFill>
+                <a:srgbClr val="000000"/>
+              </a:solidFill>
+            </a:endParaRPr>
+          </a:p>
+          <a:p>
+            <a:pPr marL="0" indent="0"/>
+            <a:r>
               <a:rPr lang="en-US" sz="5400" dirty="0">
                 <a:solidFill>
                   <a:srgbClr val="000000"/>
@@ -9039,7 +9465,7 @@
               <a:pPr>
                 <a:defRPr/>
               </a:pPr>
-              <a:t>30</a:t>
+              <a:t>32</a:t>
             </a:fld>
             <a:endParaRPr lang="en-US" dirty="0"/>
           </a:p>
@@ -9077,7 +9503,7 @@
 </p:sld>
 </file>
 
-<file path=ppt/slides/slide31.xml><?xml version="1.0" encoding="utf-8"?>
+<file path=ppt/slides/slide33.xml><?xml version="1.0" encoding="utf-8"?>
 <p:sld xmlns:a="http://schemas.openxmlformats.org/drawingml/2006/main" xmlns:r="http://schemas.openxmlformats.org/officeDocument/2006/relationships" xmlns:p="http://schemas.openxmlformats.org/presentationml/2006/main">
   <p:cSld>
     <p:spTree>
@@ -9211,7 +9637,7 @@
               <a:pPr>
                 <a:defRPr/>
               </a:pPr>
-              <a:t>31</a:t>
+              <a:t>33</a:t>
             </a:fld>
             <a:endParaRPr lang="en-US" dirty="0"/>
           </a:p>
@@ -9249,7 +9675,7 @@
 </p:sld>
 </file>
 
-<file path=ppt/slides/slide32.xml><?xml version="1.0" encoding="utf-8"?>
+<file path=ppt/slides/slide34.xml><?xml version="1.0" encoding="utf-8"?>
 <p:sld xmlns:a="http://schemas.openxmlformats.org/drawingml/2006/main" xmlns:r="http://schemas.openxmlformats.org/officeDocument/2006/relationships" xmlns:p="http://schemas.openxmlformats.org/presentationml/2006/main">
   <p:cSld>
     <p:spTree>
@@ -9350,7 +9776,7 @@
               <a:pPr>
                 <a:defRPr/>
               </a:pPr>
-              <a:t>32</a:t>
+              <a:t>34</a:t>
             </a:fld>
             <a:endParaRPr lang="en-US" dirty="0"/>
           </a:p>
@@ -9463,7 +9889,7 @@
 </p:sld>
 </file>
 
-<file path=ppt/slides/slide33.xml><?xml version="1.0" encoding="utf-8"?>
+<file path=ppt/slides/slide35.xml><?xml version="1.0" encoding="utf-8"?>
 <p:sld xmlns:a="http://schemas.openxmlformats.org/drawingml/2006/main" xmlns:r="http://schemas.openxmlformats.org/officeDocument/2006/relationships" xmlns:p="http://schemas.openxmlformats.org/presentationml/2006/main">
   <p:cSld>
     <p:spTree>
@@ -9588,7 +10014,7 @@
               <a:pPr>
                 <a:defRPr/>
               </a:pPr>
-              <a:t>33</a:t>
+              <a:t>35</a:t>
             </a:fld>
             <a:endParaRPr lang="en-US" dirty="0"/>
           </a:p>
@@ -10087,7 +10513,7 @@
           <a:p>
             <a:r>
               <a:rPr lang="en-US" dirty="0" smtClean="0"/>
-              <a:t>Group Dynamics</a:t>
+              <a:t>Team Problem Solving</a:t>
             </a:r>
             <a:endParaRPr lang="en-US" dirty="0"/>
           </a:p>
@@ -10105,8 +10531,8 @@
         </p:nvSpPr>
         <p:spPr>
           <a:xfrm>
-            <a:off x="304800" y="1549400"/>
-            <a:ext cx="8661400" cy="4686300"/>
+            <a:off x="266700" y="1511300"/>
+            <a:ext cx="8737600" cy="4648200"/>
           </a:xfrm>
         </p:spPr>
         <p:txBody>
@@ -10115,45 +10541,52 @@
           <a:p>
             <a:r>
               <a:rPr lang="en-US" sz="4800" dirty="0" smtClean="0"/>
-              <a:t>Focus on fostering teamwork.</a:t>
-            </a:r>
-          </a:p>
-          <a:p>
+              <a:t>Problems give focus for </a:t>
+            </a:r>
+          </a:p>
+          <a:p>
+            <a:pPr algn="ctr"/>
+            <a:r>
+              <a:rPr lang="en-US" sz="4800" dirty="0" smtClean="0">
+                <a:solidFill>
+                  <a:srgbClr val="0000FF"/>
+                </a:solidFill>
+              </a:rPr>
+              <a:t>studying together</a:t>
+            </a:r>
+          </a:p>
+          <a:p>
+            <a:r>
+              <a:rPr lang="en-US" sz="4800" dirty="0" smtClean="0">
+                <a:solidFill>
+                  <a:srgbClr val="FF0000"/>
+                </a:solidFill>
+              </a:rPr>
+              <a:t>Don’t</a:t>
+            </a:r>
             <a:r>
               <a:rPr lang="en-US" sz="4800" dirty="0" smtClean="0"/>
-              <a:t>Observe who is</a:t>
-            </a:r>
-          </a:p>
-          <a:p>
-            <a:pPr marL="685800" indent="-685800">
-              <a:buFont typeface="Arial"/>
-              <a:buChar char="•"/>
-            </a:pPr>
+              <a:t> let team </a:t>
+            </a:r>
+            <a:r>
+              <a:rPr lang="en-US" sz="4800" dirty="0" smtClean="0">
+                <a:solidFill>
+                  <a:srgbClr val="FF0000"/>
+                </a:solidFill>
+              </a:rPr>
+              <a:t>rush to finish </a:t>
+            </a:r>
+          </a:p>
+          <a:p>
             <a:r>
               <a:rPr lang="en-US" sz="4800" dirty="0" smtClean="0"/>
-              <a:t>not participating</a:t>
-            </a:r>
-          </a:p>
-          <a:p>
-            <a:pPr marL="685800" indent="-685800">
-              <a:buFont typeface="Arial"/>
-              <a:buChar char="•"/>
-            </a:pPr>
-            <a:r>
-              <a:rPr lang="en-US" sz="4800" dirty="0" smtClean="0"/>
-              <a:t>dominating the board</a:t>
-            </a:r>
-          </a:p>
-          <a:p>
-            <a:pPr marL="685800" indent="-685800">
-              <a:buFont typeface="Arial"/>
-              <a:buChar char="•"/>
-            </a:pPr>
-            <a:r>
-              <a:rPr lang="en-US" sz="4800" dirty="0" smtClean="0"/>
-              <a:t>being unpleasant</a:t>
-            </a:r>
-            <a:endParaRPr lang="en-US" sz="4800" dirty="0"/>
+              <a:t>and leave.</a:t>
+            </a:r>
+            <a:endParaRPr lang="en-US" sz="4800" dirty="0">
+              <a:solidFill>
+                <a:srgbClr val="008000"/>
+              </a:solidFill>
+            </a:endParaRPr>
           </a:p>
         </p:txBody>
       </p:sp>
@@ -10212,6 +10645,621 @@
                 <a:defRPr/>
               </a:pPr>
               <a:t>5</a:t>
+            </a:fld>
+            <a:endParaRPr lang="en-US" dirty="0"/>
+          </a:p>
+        </p:txBody>
+      </p:sp>
+    </p:spTree>
+    <p:extLst>
+      <p:ext uri="{BB962C8B-B14F-4D97-AF65-F5344CB8AC3E}">
+        <p14:creationId xmlns:p14="http://schemas.microsoft.com/office/powerpoint/2010/main" val="1042499299"/>
+      </p:ext>
+    </p:extLst>
+  </p:cSld>
+  <p:clrMapOvr>
+    <a:masterClrMapping/>
+  </p:clrMapOvr>
+  <mc:AlternateContent xmlns:mc="http://schemas.openxmlformats.org/markup-compatibility/2006">
+    <mc:Choice xmlns:p14="http://schemas.microsoft.com/office/powerpoint/2010/main" Requires="p14">
+      <p:transition spd="med" p14:dur="700" advClick="0">
+        <p:fade/>
+      </p:transition>
+    </mc:Choice>
+    <mc:Fallback>
+      <p:transition xmlns:p14="http://schemas.microsoft.com/office/powerpoint/2010/main" spd="med" advClick="0">
+        <p:fade/>
+      </p:transition>
+    </mc:Fallback>
+  </mc:AlternateContent>
+  <p:timing>
+    <p:tnLst>
+      <p:par>
+        <p:cTn xmlns:p14="http://schemas.microsoft.com/office/powerpoint/2010/main" id="1" dur="indefinite" restart="never" nodeType="tmRoot">
+          <p:childTnLst>
+            <p:seq concurrent="1" nextAc="seek">
+              <p:cTn id="2" dur="indefinite" nodeType="mainSeq">
+                <p:childTnLst>
+                  <p:par>
+                    <p:cTn id="3" fill="hold">
+                      <p:stCondLst>
+                        <p:cond delay="indefinite"/>
+                      </p:stCondLst>
+                      <p:childTnLst>
+                        <p:par>
+                          <p:cTn id="4" fill="hold">
+                            <p:stCondLst>
+                              <p:cond delay="0"/>
+                            </p:stCondLst>
+                            <p:childTnLst>
+                              <p:par>
+                                <p:cTn id="5" presetID="10" presetClass="entr" presetSubtype="0" fill="hold" nodeType="clickEffect">
+                                  <p:stCondLst>
+                                    <p:cond delay="0"/>
+                                  </p:stCondLst>
+                                  <p:childTnLst>
+                                    <p:set>
+                                      <p:cBhvr>
+                                        <p:cTn id="6" dur="1" fill="hold">
+                                          <p:stCondLst>
+                                            <p:cond delay="0"/>
+                                          </p:stCondLst>
+                                        </p:cTn>
+                                        <p:tgtEl>
+                                          <p:spTgt spid="3">
+                                            <p:txEl>
+                                              <p:pRg st="2" end="2"/>
+                                            </p:txEl>
+                                          </p:spTgt>
+                                        </p:tgtEl>
+                                        <p:attrNameLst>
+                                          <p:attrName>style.visibility</p:attrName>
+                                        </p:attrNameLst>
+                                      </p:cBhvr>
+                                      <p:to>
+                                        <p:strVal val="visible"/>
+                                      </p:to>
+                                    </p:set>
+                                    <p:animEffect transition="in" filter="fade">
+                                      <p:cBhvr>
+                                        <p:cTn id="7" dur="500"/>
+                                        <p:tgtEl>
+                                          <p:spTgt spid="3">
+                                            <p:txEl>
+                                              <p:pRg st="2" end="2"/>
+                                            </p:txEl>
+                                          </p:spTgt>
+                                        </p:tgtEl>
+                                      </p:cBhvr>
+                                    </p:animEffect>
+                                  </p:childTnLst>
+                                </p:cTn>
+                              </p:par>
+                              <p:par>
+                                <p:cTn id="8" presetID="10" presetClass="entr" presetSubtype="0" fill="hold" nodeType="withEffect">
+                                  <p:stCondLst>
+                                    <p:cond delay="0"/>
+                                  </p:stCondLst>
+                                  <p:childTnLst>
+                                    <p:set>
+                                      <p:cBhvr>
+                                        <p:cTn id="9" dur="1" fill="hold">
+                                          <p:stCondLst>
+                                            <p:cond delay="0"/>
+                                          </p:stCondLst>
+                                        </p:cTn>
+                                        <p:tgtEl>
+                                          <p:spTgt spid="3">
+                                            <p:txEl>
+                                              <p:pRg st="3" end="3"/>
+                                            </p:txEl>
+                                          </p:spTgt>
+                                        </p:tgtEl>
+                                        <p:attrNameLst>
+                                          <p:attrName>style.visibility</p:attrName>
+                                        </p:attrNameLst>
+                                      </p:cBhvr>
+                                      <p:to>
+                                        <p:strVal val="visible"/>
+                                      </p:to>
+                                    </p:set>
+                                    <p:animEffect transition="in" filter="fade">
+                                      <p:cBhvr>
+                                        <p:cTn id="10" dur="500"/>
+                                        <p:tgtEl>
+                                          <p:spTgt spid="3">
+                                            <p:txEl>
+                                              <p:pRg st="3" end="3"/>
+                                            </p:txEl>
+                                          </p:spTgt>
+                                        </p:tgtEl>
+                                      </p:cBhvr>
+                                    </p:animEffect>
+                                  </p:childTnLst>
+                                </p:cTn>
+                              </p:par>
+                            </p:childTnLst>
+                          </p:cTn>
+                        </p:par>
+                      </p:childTnLst>
+                    </p:cTn>
+                  </p:par>
+                </p:childTnLst>
+              </p:cTn>
+              <p:prevCondLst>
+                <p:cond evt="onPrev" delay="0">
+                  <p:tgtEl>
+                    <p:sldTgt/>
+                  </p:tgtEl>
+                </p:cond>
+              </p:prevCondLst>
+              <p:nextCondLst>
+                <p:cond evt="onNext" delay="0">
+                  <p:tgtEl>
+                    <p:sldTgt/>
+                  </p:tgtEl>
+                </p:cond>
+              </p:nextCondLst>
+            </p:seq>
+          </p:childTnLst>
+        </p:cTn>
+      </p:par>
+    </p:tnLst>
+  </p:timing>
+</p:sld>
+</file>
+
+<file path=ppt/slides/slide6.xml><?xml version="1.0" encoding="utf-8"?>
+<p:sld xmlns:a="http://schemas.openxmlformats.org/drawingml/2006/main" xmlns:r="http://schemas.openxmlformats.org/officeDocument/2006/relationships" xmlns:p="http://schemas.openxmlformats.org/presentationml/2006/main">
+  <p:cSld>
+    <p:spTree>
+      <p:nvGrpSpPr>
+        <p:cNvPr id="1" name=""/>
+        <p:cNvGrpSpPr/>
+        <p:nvPr/>
+      </p:nvGrpSpPr>
+      <p:grpSpPr>
+        <a:xfrm>
+          <a:off x="0" y="0"/>
+          <a:ext cx="0" cy="0"/>
+          <a:chOff x="0" y="0"/>
+          <a:chExt cx="0" cy="0"/>
+        </a:xfrm>
+      </p:grpSpPr>
+      <p:sp>
+        <p:nvSpPr>
+          <p:cNvPr id="2" name="Title 1"/>
+          <p:cNvSpPr>
+            <a:spLocks noGrp="1"/>
+          </p:cNvSpPr>
+          <p:nvPr>
+            <p:ph type="title"/>
+          </p:nvPr>
+        </p:nvSpPr>
+        <p:spPr/>
+        <p:txBody>
+          <a:bodyPr/>
+          <a:lstStyle/>
+          <a:p>
+            <a:r>
+              <a:rPr lang="en-US" dirty="0" smtClean="0"/>
+              <a:t>Team Problem Solving</a:t>
+            </a:r>
+            <a:endParaRPr lang="en-US" dirty="0"/>
+          </a:p>
+        </p:txBody>
+      </p:sp>
+      <p:sp>
+        <p:nvSpPr>
+          <p:cNvPr id="3" name="Content Placeholder 2"/>
+          <p:cNvSpPr>
+            <a:spLocks noGrp="1"/>
+          </p:cNvSpPr>
+          <p:nvPr>
+            <p:ph idx="1"/>
+          </p:nvPr>
+        </p:nvSpPr>
+        <p:spPr>
+          <a:xfrm>
+            <a:off x="266700" y="1511300"/>
+            <a:ext cx="8737600" cy="4648200"/>
+          </a:xfrm>
+        </p:spPr>
+        <p:txBody>
+          <a:bodyPr/>
+          <a:lstStyle/>
+          <a:p>
+            <a:r>
+              <a:rPr lang="en-US" sz="4800" dirty="0" smtClean="0"/>
+              <a:t>Problems give focus for </a:t>
+            </a:r>
+          </a:p>
+          <a:p>
+            <a:pPr algn="ctr"/>
+            <a:r>
+              <a:rPr lang="en-US" sz="4800" dirty="0" smtClean="0">
+                <a:solidFill>
+                  <a:srgbClr val="0000FF"/>
+                </a:solidFill>
+              </a:rPr>
+              <a:t>learning together</a:t>
+            </a:r>
+          </a:p>
+          <a:p>
+            <a:r>
+              <a:rPr lang="en-US" sz="4800" dirty="0" smtClean="0">
+                <a:solidFill>
+                  <a:srgbClr val="FF0000"/>
+                </a:solidFill>
+              </a:rPr>
+              <a:t>Don’t</a:t>
+            </a:r>
+            <a:r>
+              <a:rPr lang="en-US" sz="4800" dirty="0" smtClean="0"/>
+              <a:t> let team </a:t>
+            </a:r>
+            <a:r>
+              <a:rPr lang="en-US" sz="4800" dirty="0" smtClean="0">
+                <a:solidFill>
+                  <a:srgbClr val="FF0000"/>
+                </a:solidFill>
+              </a:rPr>
+              <a:t>rush to finish </a:t>
+            </a:r>
+          </a:p>
+          <a:p>
+            <a:r>
+              <a:rPr lang="en-US" sz="4800" dirty="0" smtClean="0"/>
+              <a:t>and leave.  Use extra time to</a:t>
+            </a:r>
+          </a:p>
+          <a:p>
+            <a:pPr algn="ctr"/>
+            <a:r>
+              <a:rPr lang="en-US" sz="4800" dirty="0" smtClean="0">
+                <a:solidFill>
+                  <a:srgbClr val="008000"/>
+                </a:solidFill>
+              </a:rPr>
+              <a:t>review, critique, generalize</a:t>
+            </a:r>
+            <a:endParaRPr lang="en-US" sz="4800" dirty="0">
+              <a:solidFill>
+                <a:srgbClr val="008000"/>
+              </a:solidFill>
+            </a:endParaRPr>
+          </a:p>
+        </p:txBody>
+      </p:sp>
+      <p:sp>
+        <p:nvSpPr>
+          <p:cNvPr id="5" name="Rectangle 11"/>
+          <p:cNvSpPr>
+            <a:spLocks noGrp="1" noChangeArrowheads="1"/>
+          </p:cNvSpPr>
+          <p:nvPr>
+            <p:ph type="sldNum" sz="quarter" idx="4"/>
+          </p:nvPr>
+        </p:nvSpPr>
+        <p:spPr bwMode="auto">
+          <a:xfrm>
+            <a:off x="8061932" y="6553200"/>
+            <a:ext cx="1082072" cy="276999"/>
+          </a:xfrm>
+          <a:prstGeom prst="rect">
+            <a:avLst/>
+          </a:prstGeom>
+          <a:noFill/>
+          <a:ln w="9525">
+            <a:noFill/>
+            <a:miter lim="800000"/>
+            <a:headEnd/>
+            <a:tailEnd/>
+          </a:ln>
+          <a:effectLst/>
+        </p:spPr>
+        <p:txBody>
+          <a:bodyPr vert="horz" wrap="none" lIns="91440" tIns="45720" rIns="91440" bIns="45720" numCol="1" anchor="t" anchorCtr="0" compatLnSpc="1">
+            <a:prstTxWarp prst="textNoShape">
+              <a:avLst/>
+            </a:prstTxWarp>
+            <a:spAutoFit/>
+          </a:bodyPr>
+          <a:lstStyle>
+            <a:lvl1pPr algn="r">
+              <a:defRPr sz="1200">
+                <a:latin typeface="Comic Sans MS" pitchFamily="66" charset="0"/>
+              </a:defRPr>
+            </a:lvl1pPr>
+          </a:lstStyle>
+          <a:p>
+            <a:pPr>
+              <a:defRPr/>
+            </a:pPr>
+            <a:r>
+              <a:rPr lang="en-US" dirty="0" smtClean="0"/>
+              <a:t>coaching.</a:t>
+            </a:r>
+            <a:fld id="{EBFB97A3-F52F-4FD6-B1AC-522A20C95467}" type="slidenum">
+              <a:rPr lang="en-US" smtClean="0"/>
+              <a:pPr>
+                <a:defRPr/>
+              </a:pPr>
+              <a:t>6</a:t>
+            </a:fld>
+            <a:endParaRPr lang="en-US" dirty="0"/>
+          </a:p>
+        </p:txBody>
+      </p:sp>
+    </p:spTree>
+    <p:extLst>
+      <p:ext uri="{BB962C8B-B14F-4D97-AF65-F5344CB8AC3E}">
+        <p14:creationId xmlns:p14="http://schemas.microsoft.com/office/powerpoint/2010/main" val="3933249977"/>
+      </p:ext>
+    </p:extLst>
+  </p:cSld>
+  <p:clrMapOvr>
+    <a:masterClrMapping/>
+  </p:clrMapOvr>
+  <p:transition xmlns:p14="http://schemas.microsoft.com/office/powerpoint/2010/main" advClick="0">
+    <p:fade/>
+  </p:transition>
+  <p:timing>
+    <p:tnLst>
+      <p:par>
+        <p:cTn xmlns:p14="http://schemas.microsoft.com/office/powerpoint/2010/main" id="1" dur="indefinite" restart="never" nodeType="tmRoot">
+          <p:childTnLst>
+            <p:seq concurrent="1" nextAc="seek">
+              <p:cTn id="2" dur="indefinite" nodeType="mainSeq">
+                <p:childTnLst>
+                  <p:par>
+                    <p:cTn id="3" fill="hold">
+                      <p:stCondLst>
+                        <p:cond delay="indefinite"/>
+                        <p:cond evt="onBegin" delay="0">
+                          <p:tn val="2"/>
+                        </p:cond>
+                      </p:stCondLst>
+                      <p:childTnLst>
+                        <p:par>
+                          <p:cTn id="4" fill="hold">
+                            <p:stCondLst>
+                              <p:cond delay="0"/>
+                            </p:stCondLst>
+                            <p:childTnLst>
+                              <p:par>
+                                <p:cTn id="5" presetID="10" presetClass="entr" presetSubtype="0" fill="hold" nodeType="afterEffect">
+                                  <p:stCondLst>
+                                    <p:cond delay="0"/>
+                                  </p:stCondLst>
+                                  <p:childTnLst>
+                                    <p:set>
+                                      <p:cBhvr>
+                                        <p:cTn id="6" dur="1" fill="hold">
+                                          <p:stCondLst>
+                                            <p:cond delay="0"/>
+                                          </p:stCondLst>
+                                        </p:cTn>
+                                        <p:tgtEl>
+                                          <p:spTgt spid="3">
+                                            <p:txEl>
+                                              <p:pRg st="4" end="4"/>
+                                            </p:txEl>
+                                          </p:spTgt>
+                                        </p:tgtEl>
+                                        <p:attrNameLst>
+                                          <p:attrName>style.visibility</p:attrName>
+                                        </p:attrNameLst>
+                                      </p:cBhvr>
+                                      <p:to>
+                                        <p:strVal val="visible"/>
+                                      </p:to>
+                                    </p:set>
+                                    <p:animEffect transition="in" filter="fade">
+                                      <p:cBhvr>
+                                        <p:cTn id="7" dur="1000"/>
+                                        <p:tgtEl>
+                                          <p:spTgt spid="3">
+                                            <p:txEl>
+                                              <p:pRg st="4" end="4"/>
+                                            </p:txEl>
+                                          </p:spTgt>
+                                        </p:tgtEl>
+                                      </p:cBhvr>
+                                    </p:animEffect>
+                                  </p:childTnLst>
+                                </p:cTn>
+                              </p:par>
+                            </p:childTnLst>
+                          </p:cTn>
+                        </p:par>
+                      </p:childTnLst>
+                    </p:cTn>
+                  </p:par>
+                </p:childTnLst>
+              </p:cTn>
+              <p:prevCondLst>
+                <p:cond evt="onPrev" delay="0">
+                  <p:tgtEl>
+                    <p:sldTgt/>
+                  </p:tgtEl>
+                </p:cond>
+              </p:prevCondLst>
+              <p:nextCondLst>
+                <p:cond evt="onNext" delay="0">
+                  <p:tgtEl>
+                    <p:sldTgt/>
+                  </p:tgtEl>
+                </p:cond>
+              </p:nextCondLst>
+            </p:seq>
+          </p:childTnLst>
+        </p:cTn>
+      </p:par>
+    </p:tnLst>
+  </p:timing>
+</p:sld>
+</file>
+
+<file path=ppt/slides/slide7.xml><?xml version="1.0" encoding="utf-8"?>
+<p:sld xmlns:a="http://schemas.openxmlformats.org/drawingml/2006/main" xmlns:r="http://schemas.openxmlformats.org/officeDocument/2006/relationships" xmlns:p="http://schemas.openxmlformats.org/presentationml/2006/main">
+  <p:cSld>
+    <p:spTree>
+      <p:nvGrpSpPr>
+        <p:cNvPr id="1" name=""/>
+        <p:cNvGrpSpPr/>
+        <p:nvPr/>
+      </p:nvGrpSpPr>
+      <p:grpSpPr>
+        <a:xfrm>
+          <a:off x="0" y="0"/>
+          <a:ext cx="0" cy="0"/>
+          <a:chOff x="0" y="0"/>
+          <a:chExt cx="0" cy="0"/>
+        </a:xfrm>
+      </p:grpSpPr>
+      <p:sp>
+        <p:nvSpPr>
+          <p:cNvPr id="2" name="Title 1"/>
+          <p:cNvSpPr>
+            <a:spLocks noGrp="1"/>
+          </p:cNvSpPr>
+          <p:nvPr>
+            <p:ph type="title"/>
+          </p:nvPr>
+        </p:nvSpPr>
+        <p:spPr/>
+        <p:txBody>
+          <a:bodyPr/>
+          <a:lstStyle/>
+          <a:p>
+            <a:r>
+              <a:rPr lang="en-US" dirty="0" smtClean="0"/>
+              <a:t>Group Dynamics</a:t>
+            </a:r>
+            <a:endParaRPr lang="en-US" dirty="0"/>
+          </a:p>
+        </p:txBody>
+      </p:sp>
+      <p:sp>
+        <p:nvSpPr>
+          <p:cNvPr id="3" name="Content Placeholder 2"/>
+          <p:cNvSpPr>
+            <a:spLocks noGrp="1"/>
+          </p:cNvSpPr>
+          <p:nvPr>
+            <p:ph idx="1"/>
+          </p:nvPr>
+        </p:nvSpPr>
+        <p:spPr>
+          <a:xfrm>
+            <a:off x="304800" y="1549400"/>
+            <a:ext cx="8661400" cy="4686300"/>
+          </a:xfrm>
+        </p:spPr>
+        <p:txBody>
+          <a:bodyPr/>
+          <a:lstStyle/>
+          <a:p>
+            <a:r>
+              <a:rPr lang="en-US" sz="4800" dirty="0" smtClean="0"/>
+              <a:t>Focus on fostering teamwork.</a:t>
+            </a:r>
+          </a:p>
+          <a:p>
+            <a:r>
+              <a:rPr lang="en-US" sz="4800" dirty="0" smtClean="0"/>
+              <a:t>Observe who is</a:t>
+            </a:r>
+          </a:p>
+          <a:p>
+            <a:pPr marL="685800" indent="-685800">
+              <a:buFont typeface="Arial"/>
+              <a:buChar char="•"/>
+            </a:pPr>
+            <a:r>
+              <a:rPr lang="en-US" sz="4800" dirty="0" smtClean="0"/>
+              <a:t>not participating</a:t>
+            </a:r>
+          </a:p>
+          <a:p>
+            <a:pPr marL="685800" indent="-685800">
+              <a:buFont typeface="Arial"/>
+              <a:buChar char="•"/>
+            </a:pPr>
+            <a:r>
+              <a:rPr lang="en-US" sz="4800" dirty="0" smtClean="0"/>
+              <a:t>dominating the board</a:t>
+            </a:r>
+          </a:p>
+          <a:p>
+            <a:pPr marL="685800" indent="-685800">
+              <a:buFont typeface="Arial"/>
+              <a:buChar char="•"/>
+            </a:pPr>
+            <a:r>
+              <a:rPr lang="en-US" sz="4800" dirty="0" smtClean="0"/>
+              <a:t>being unpleasant</a:t>
+            </a:r>
+            <a:endParaRPr lang="en-US" sz="4800" dirty="0"/>
+          </a:p>
+        </p:txBody>
+      </p:sp>
+      <p:sp>
+        <p:nvSpPr>
+          <p:cNvPr id="5" name="Rectangle 11"/>
+          <p:cNvSpPr>
+            <a:spLocks noGrp="1" noChangeArrowheads="1"/>
+          </p:cNvSpPr>
+          <p:nvPr>
+            <p:ph type="sldNum" sz="quarter" idx="4"/>
+          </p:nvPr>
+        </p:nvSpPr>
+        <p:spPr bwMode="auto">
+          <a:xfrm>
+            <a:off x="8061932" y="6553200"/>
+            <a:ext cx="1082072" cy="276999"/>
+          </a:xfrm>
+          <a:prstGeom prst="rect">
+            <a:avLst/>
+          </a:prstGeom>
+          <a:noFill/>
+          <a:ln w="9525">
+            <a:noFill/>
+            <a:miter lim="800000"/>
+            <a:headEnd/>
+            <a:tailEnd/>
+          </a:ln>
+          <a:effectLst/>
+        </p:spPr>
+        <p:txBody>
+          <a:bodyPr vert="horz" wrap="none" lIns="91440" tIns="45720" rIns="91440" bIns="45720" numCol="1" anchor="t" anchorCtr="0" compatLnSpc="1">
+            <a:prstTxWarp prst="textNoShape">
+              <a:avLst/>
+            </a:prstTxWarp>
+            <a:spAutoFit/>
+          </a:bodyPr>
+          <a:lstStyle>
+            <a:lvl1pPr algn="r">
+              <a:defRPr sz="1200">
+                <a:latin typeface="Comic Sans MS" pitchFamily="66" charset="0"/>
+              </a:defRPr>
+            </a:lvl1pPr>
+          </a:lstStyle>
+          <a:p>
+            <a:pPr>
+              <a:defRPr/>
+            </a:pPr>
+            <a:r>
+              <a:rPr lang="en-US" dirty="0" smtClean="0"/>
+              <a:t>coaching.</a:t>
+            </a:r>
+            <a:fld id="{EBFB97A3-F52F-4FD6-B1AC-522A20C95467}" type="slidenum">
+              <a:rPr lang="en-US" smtClean="0"/>
+              <a:pPr>
+                <a:defRPr/>
+              </a:pPr>
+              <a:t>7</a:t>
             </a:fld>
             <a:endParaRPr lang="en-US" dirty="0"/>
           </a:p>
@@ -10489,7 +11537,7 @@
 </p:sld>
 </file>
 
-<file path=ppt/slides/slide6.xml><?xml version="1.0" encoding="utf-8"?>
+<file path=ppt/slides/slide8.xml><?xml version="1.0" encoding="utf-8"?>
 <p:sld xmlns:a="http://schemas.openxmlformats.org/drawingml/2006/main" xmlns:r="http://schemas.openxmlformats.org/officeDocument/2006/relationships" xmlns:p="http://schemas.openxmlformats.org/presentationml/2006/main">
   <p:cSld>
     <p:spTree>
@@ -10646,7 +11694,7 @@
               <a:pPr>
                 <a:defRPr/>
               </a:pPr>
-              <a:t>6</a:t>
+              <a:t>8</a:t>
             </a:fld>
             <a:endParaRPr lang="en-US" dirty="0"/>
           </a:p>
@@ -10829,7 +11877,7 @@
 </p:sld>
 </file>
 
-<file path=ppt/slides/slide7.xml><?xml version="1.0" encoding="utf-8"?>
+<file path=ppt/slides/slide9.xml><?xml version="1.0" encoding="utf-8"?>
 <p:sld xmlns:a="http://schemas.openxmlformats.org/drawingml/2006/main" xmlns:r="http://schemas.openxmlformats.org/officeDocument/2006/relationships" xmlns:p="http://schemas.openxmlformats.org/presentationml/2006/main">
   <p:cSld>
     <p:spTree>
@@ -10966,7 +12014,7 @@
               <a:pPr>
                 <a:defRPr/>
               </a:pPr>
-              <a:t>7</a:t>
+              <a:t>9</a:t>
             </a:fld>
             <a:endParaRPr lang="en-US" dirty="0"/>
           </a:p>
@@ -10994,430 +12042,6 @@
       </p:transition>
     </mc:Fallback>
   </mc:AlternateContent>
-  <p:timing>
-    <p:tnLst>
-      <p:par>
-        <p:cTn xmlns:p14="http://schemas.microsoft.com/office/powerpoint/2010/main" id="1" dur="indefinite" restart="never" nodeType="tmRoot"/>
-      </p:par>
-    </p:tnLst>
-  </p:timing>
-</p:sld>
-</file>
-
-<file path=ppt/slides/slide8.xml><?xml version="1.0" encoding="utf-8"?>
-<p:sld xmlns:a="http://schemas.openxmlformats.org/drawingml/2006/main" xmlns:r="http://schemas.openxmlformats.org/officeDocument/2006/relationships" xmlns:p="http://schemas.openxmlformats.org/presentationml/2006/main">
-  <p:cSld>
-    <p:spTree>
-      <p:nvGrpSpPr>
-        <p:cNvPr id="1" name=""/>
-        <p:cNvGrpSpPr/>
-        <p:nvPr/>
-      </p:nvGrpSpPr>
-      <p:grpSpPr>
-        <a:xfrm>
-          <a:off x="0" y="0"/>
-          <a:ext cx="0" cy="0"/>
-          <a:chOff x="0" y="0"/>
-          <a:chExt cx="0" cy="0"/>
-        </a:xfrm>
-      </p:grpSpPr>
-      <p:sp>
-        <p:nvSpPr>
-          <p:cNvPr id="2" name="Title 1"/>
-          <p:cNvSpPr>
-            <a:spLocks noGrp="1"/>
-          </p:cNvSpPr>
-          <p:nvPr>
-            <p:ph type="title"/>
-          </p:nvPr>
-        </p:nvSpPr>
-        <p:spPr/>
-        <p:txBody>
-          <a:bodyPr/>
-          <a:lstStyle/>
-          <a:p>
-            <a:r>
-              <a:rPr lang="en-US" dirty="0" smtClean="0"/>
-              <a:t>Group Dynamics</a:t>
-            </a:r>
-            <a:endParaRPr lang="en-US" dirty="0"/>
-          </a:p>
-        </p:txBody>
-      </p:sp>
-      <p:sp>
-        <p:nvSpPr>
-          <p:cNvPr id="3" name="Content Placeholder 2"/>
-          <p:cNvSpPr>
-            <a:spLocks noGrp="1"/>
-          </p:cNvSpPr>
-          <p:nvPr>
-            <p:ph idx="1"/>
-          </p:nvPr>
-        </p:nvSpPr>
-        <p:spPr>
-          <a:xfrm>
-            <a:off x="304800" y="1549400"/>
-            <a:ext cx="8623300" cy="3606800"/>
-          </a:xfrm>
-        </p:spPr>
-        <p:txBody>
-          <a:bodyPr/>
-          <a:lstStyle/>
-          <a:p>
-            <a:r>
-              <a:rPr lang="en-US" sz="4800" dirty="0" smtClean="0"/>
-              <a:t>Report your observations in staff meeting and get advice on managing.</a:t>
-            </a:r>
-          </a:p>
-          <a:p>
-            <a:r>
-              <a:rPr lang="en-US" sz="4800" dirty="0" smtClean="0"/>
-              <a:t>Notify instructors if urgent.</a:t>
-            </a:r>
-          </a:p>
-        </p:txBody>
-      </p:sp>
-      <p:sp>
-        <p:nvSpPr>
-          <p:cNvPr id="5" name="Rectangle 11"/>
-          <p:cNvSpPr>
-            <a:spLocks noGrp="1" noChangeArrowheads="1"/>
-          </p:cNvSpPr>
-          <p:nvPr>
-            <p:ph type="sldNum" sz="quarter" idx="4"/>
-          </p:nvPr>
-        </p:nvSpPr>
-        <p:spPr bwMode="auto">
-          <a:xfrm>
-            <a:off x="8061932" y="6553200"/>
-            <a:ext cx="1082072" cy="276999"/>
-          </a:xfrm>
-          <a:prstGeom prst="rect">
-            <a:avLst/>
-          </a:prstGeom>
-          <a:noFill/>
-          <a:ln w="9525">
-            <a:noFill/>
-            <a:miter lim="800000"/>
-            <a:headEnd/>
-            <a:tailEnd/>
-          </a:ln>
-          <a:effectLst/>
-        </p:spPr>
-        <p:txBody>
-          <a:bodyPr vert="horz" wrap="none" lIns="91440" tIns="45720" rIns="91440" bIns="45720" numCol="1" anchor="t" anchorCtr="0" compatLnSpc="1">
-            <a:prstTxWarp prst="textNoShape">
-              <a:avLst/>
-            </a:prstTxWarp>
-            <a:spAutoFit/>
-          </a:bodyPr>
-          <a:lstStyle>
-            <a:lvl1pPr algn="r">
-              <a:defRPr sz="1200">
-                <a:latin typeface="Comic Sans MS" pitchFamily="66" charset="0"/>
-              </a:defRPr>
-            </a:lvl1pPr>
-          </a:lstStyle>
-          <a:p>
-            <a:pPr>
-              <a:defRPr/>
-            </a:pPr>
-            <a:r>
-              <a:rPr lang="en-US" dirty="0" smtClean="0"/>
-              <a:t>coaching.</a:t>
-            </a:r>
-            <a:fld id="{EBFB97A3-F52F-4FD6-B1AC-522A20C95467}" type="slidenum">
-              <a:rPr lang="en-US" smtClean="0"/>
-              <a:pPr>
-                <a:defRPr/>
-              </a:pPr>
-              <a:t>8</a:t>
-            </a:fld>
-            <a:endParaRPr lang="en-US" dirty="0"/>
-          </a:p>
-        </p:txBody>
-      </p:sp>
-    </p:spTree>
-    <p:extLst>
-      <p:ext uri="{BB962C8B-B14F-4D97-AF65-F5344CB8AC3E}">
-        <p14:creationId xmlns:p14="http://schemas.microsoft.com/office/powerpoint/2010/main" val="3579123358"/>
-      </p:ext>
-    </p:extLst>
-  </p:cSld>
-  <p:clrMapOvr>
-    <a:masterClrMapping/>
-  </p:clrMapOvr>
-  <mc:AlternateContent xmlns:mc="http://schemas.openxmlformats.org/markup-compatibility/2006" xmlns:p14="http://schemas.microsoft.com/office/powerpoint/2010/main">
-    <mc:Choice Requires="p14">
-      <p:transition spd="slow" p14:dur="900" advClick="0">
-        <p:fade/>
-      </p:transition>
-    </mc:Choice>
-    <mc:Fallback xmlns="">
-      <p:transition xmlns:p14="http://schemas.microsoft.com/office/powerpoint/2010/main" spd="slow" advClick="0">
-        <p:fade/>
-      </p:transition>
-    </mc:Fallback>
-  </mc:AlternateContent>
-  <p:timing>
-    <p:tnLst>
-      <p:par>
-        <p:cTn xmlns:p14="http://schemas.microsoft.com/office/powerpoint/2010/main" id="1" dur="indefinite" restart="never" nodeType="tmRoot">
-          <p:childTnLst>
-            <p:seq concurrent="1" nextAc="seek">
-              <p:cTn id="2" dur="indefinite" nodeType="mainSeq">
-                <p:childTnLst>
-                  <p:par>
-                    <p:cTn id="3" fill="hold">
-                      <p:stCondLst>
-                        <p:cond delay="indefinite"/>
-                      </p:stCondLst>
-                      <p:childTnLst>
-                        <p:par>
-                          <p:cTn id="4" fill="hold">
-                            <p:stCondLst>
-                              <p:cond delay="0"/>
-                            </p:stCondLst>
-                            <p:childTnLst>
-                              <p:par>
-                                <p:cTn id="5" presetID="9" presetClass="entr" presetSubtype="0" fill="hold" nodeType="clickEffect">
-                                  <p:stCondLst>
-                                    <p:cond delay="0"/>
-                                  </p:stCondLst>
-                                  <p:childTnLst>
-                                    <p:set>
-                                      <p:cBhvr>
-                                        <p:cTn id="6" dur="1" fill="hold">
-                                          <p:stCondLst>
-                                            <p:cond delay="0"/>
-                                          </p:stCondLst>
-                                        </p:cTn>
-                                        <p:tgtEl>
-                                          <p:spTgt spid="3">
-                                            <p:txEl>
-                                              <p:pRg st="1" end="1"/>
-                                            </p:txEl>
-                                          </p:spTgt>
-                                        </p:tgtEl>
-                                        <p:attrNameLst>
-                                          <p:attrName>style.visibility</p:attrName>
-                                        </p:attrNameLst>
-                                      </p:cBhvr>
-                                      <p:to>
-                                        <p:strVal val="visible"/>
-                                      </p:to>
-                                    </p:set>
-                                    <p:animEffect transition="in" filter="dissolve">
-                                      <p:cBhvr>
-                                        <p:cTn id="7" dur="500"/>
-                                        <p:tgtEl>
-                                          <p:spTgt spid="3">
-                                            <p:txEl>
-                                              <p:pRg st="1" end="1"/>
-                                            </p:txEl>
-                                          </p:spTgt>
-                                        </p:tgtEl>
-                                      </p:cBhvr>
-                                    </p:animEffect>
-                                  </p:childTnLst>
-                                </p:cTn>
-                              </p:par>
-                            </p:childTnLst>
-                          </p:cTn>
-                        </p:par>
-                      </p:childTnLst>
-                    </p:cTn>
-                  </p:par>
-                </p:childTnLst>
-              </p:cTn>
-              <p:prevCondLst>
-                <p:cond evt="onPrev" delay="0">
-                  <p:tgtEl>
-                    <p:sldTgt/>
-                  </p:tgtEl>
-                </p:cond>
-              </p:prevCondLst>
-              <p:nextCondLst>
-                <p:cond evt="onNext" delay="0">
-                  <p:tgtEl>
-                    <p:sldTgt/>
-                  </p:tgtEl>
-                </p:cond>
-              </p:nextCondLst>
-            </p:seq>
-          </p:childTnLst>
-        </p:cTn>
-      </p:par>
-    </p:tnLst>
-  </p:timing>
-</p:sld>
-</file>
-
-<file path=ppt/slides/slide9.xml><?xml version="1.0" encoding="utf-8"?>
-<p:sld xmlns:a="http://schemas.openxmlformats.org/drawingml/2006/main" xmlns:r="http://schemas.openxmlformats.org/officeDocument/2006/relationships" xmlns:p="http://schemas.openxmlformats.org/presentationml/2006/main">
-  <p:cSld>
-    <p:spTree>
-      <p:nvGrpSpPr>
-        <p:cNvPr id="1" name=""/>
-        <p:cNvGrpSpPr/>
-        <p:nvPr/>
-      </p:nvGrpSpPr>
-      <p:grpSpPr>
-        <a:xfrm>
-          <a:off x="0" y="0"/>
-          <a:ext cx="0" cy="0"/>
-          <a:chOff x="0" y="0"/>
-          <a:chExt cx="0" cy="0"/>
-        </a:xfrm>
-      </p:grpSpPr>
-      <p:sp>
-        <p:nvSpPr>
-          <p:cNvPr id="2" name="Title 1"/>
-          <p:cNvSpPr>
-            <a:spLocks noGrp="1"/>
-          </p:cNvSpPr>
-          <p:nvPr>
-            <p:ph type="title"/>
-          </p:nvPr>
-        </p:nvSpPr>
-        <p:spPr/>
-        <p:txBody>
-          <a:bodyPr/>
-          <a:lstStyle/>
-          <a:p>
-            <a:r>
-              <a:rPr lang="en-US" dirty="0" smtClean="0"/>
-              <a:t>Team Solutions</a:t>
-            </a:r>
-            <a:endParaRPr lang="en-US" dirty="0"/>
-          </a:p>
-        </p:txBody>
-      </p:sp>
-      <p:sp>
-        <p:nvSpPr>
-          <p:cNvPr id="3" name="Content Placeholder 2"/>
-          <p:cNvSpPr>
-            <a:spLocks noGrp="1"/>
-          </p:cNvSpPr>
-          <p:nvPr>
-            <p:ph idx="1"/>
-          </p:nvPr>
-        </p:nvSpPr>
-        <p:spPr>
-          <a:xfrm>
-            <a:off x="241300" y="1409700"/>
-            <a:ext cx="8585200" cy="4038600"/>
-          </a:xfrm>
-        </p:spPr>
-        <p:txBody>
-          <a:bodyPr/>
-          <a:lstStyle/>
-          <a:p>
-            <a:r>
-              <a:rPr lang="en-US" sz="4800" dirty="0" smtClean="0"/>
-              <a:t>A </a:t>
-            </a:r>
-            <a:r>
-              <a:rPr lang="en-US" sz="4800" dirty="0" smtClean="0">
-                <a:solidFill>
-                  <a:srgbClr val="008000"/>
-                </a:solidFill>
-              </a:rPr>
-              <a:t>good answer</a:t>
-            </a:r>
-            <a:r>
-              <a:rPr lang="en-US" sz="4800" dirty="0" smtClean="0"/>
-              <a:t> is one that a student from another team who wanted the solution could </a:t>
-            </a:r>
-            <a:r>
-              <a:rPr lang="en-US" sz="4800" dirty="0" smtClean="0">
-                <a:solidFill>
-                  <a:srgbClr val="0000E5"/>
-                </a:solidFill>
-              </a:rPr>
-              <a:t>look at the board and say “of course.”</a:t>
-            </a:r>
-            <a:endParaRPr lang="en-US" sz="4800" dirty="0">
-              <a:solidFill>
-                <a:srgbClr val="0000E5"/>
-              </a:solidFill>
-            </a:endParaRPr>
-          </a:p>
-        </p:txBody>
-      </p:sp>
-      <p:sp>
-        <p:nvSpPr>
-          <p:cNvPr id="5" name="Rectangle 11"/>
-          <p:cNvSpPr>
-            <a:spLocks noGrp="1" noChangeArrowheads="1"/>
-          </p:cNvSpPr>
-          <p:nvPr>
-            <p:ph type="sldNum" sz="quarter" idx="4"/>
-          </p:nvPr>
-        </p:nvSpPr>
-        <p:spPr bwMode="auto">
-          <a:xfrm>
-            <a:off x="8061932" y="6553200"/>
-            <a:ext cx="1082072" cy="276999"/>
-          </a:xfrm>
-          <a:prstGeom prst="rect">
-            <a:avLst/>
-          </a:prstGeom>
-          <a:noFill/>
-          <a:ln w="9525">
-            <a:noFill/>
-            <a:miter lim="800000"/>
-            <a:headEnd/>
-            <a:tailEnd/>
-          </a:ln>
-          <a:effectLst/>
-        </p:spPr>
-        <p:txBody>
-          <a:bodyPr vert="horz" wrap="none" lIns="91440" tIns="45720" rIns="91440" bIns="45720" numCol="1" anchor="t" anchorCtr="0" compatLnSpc="1">
-            <a:prstTxWarp prst="textNoShape">
-              <a:avLst/>
-            </a:prstTxWarp>
-            <a:spAutoFit/>
-          </a:bodyPr>
-          <a:lstStyle>
-            <a:lvl1pPr algn="r">
-              <a:defRPr sz="1200">
-                <a:latin typeface="Comic Sans MS" pitchFamily="66" charset="0"/>
-              </a:defRPr>
-            </a:lvl1pPr>
-          </a:lstStyle>
-          <a:p>
-            <a:pPr>
-              <a:defRPr/>
-            </a:pPr>
-            <a:r>
-              <a:rPr lang="en-US" dirty="0" smtClean="0"/>
-              <a:t>coaching.</a:t>
-            </a:r>
-            <a:fld id="{EBFB97A3-F52F-4FD6-B1AC-522A20C95467}" type="slidenum">
-              <a:rPr lang="en-US" smtClean="0"/>
-              <a:pPr>
-                <a:defRPr/>
-              </a:pPr>
-              <a:t>9</a:t>
-            </a:fld>
-            <a:endParaRPr lang="en-US" dirty="0"/>
-          </a:p>
-        </p:txBody>
-      </p:sp>
-    </p:spTree>
-    <p:extLst>
-      <p:ext uri="{BB962C8B-B14F-4D97-AF65-F5344CB8AC3E}">
-        <p14:creationId xmlns:p14="http://schemas.microsoft.com/office/powerpoint/2010/main" val="2445494053"/>
-      </p:ext>
-    </p:extLst>
-  </p:cSld>
-  <p:clrMapOvr>
-    <a:masterClrMapping/>
-  </p:clrMapOvr>
-  <p:transition xmlns:p14="http://schemas.microsoft.com/office/powerpoint/2010/main" spd="slow" advClick="0">
-    <p:fade thruBlk="1"/>
-  </p:transition>
   <p:timing>
     <p:tnLst>
       <p:par>

</xml_diff>